<commit_message>
Added ppt and pdf
</commit_message>
<xml_diff>
--- a/NM391 The Ones n Zeros.pptx
+++ b/NM391 The Ones n Zeros.pptx
@@ -1,91 +1,63 @@
 
 <file path=ppt/presentation.xml><?xml version="1.0" encoding="utf-8"?>
-<p:presentation xmlns:a="http://schemas.openxmlformats.org/drawingml/2006/main" xmlns:r="http://schemas.openxmlformats.org/officeDocument/2006/relationships" xmlns:p="http://schemas.openxmlformats.org/presentationml/2006/main" saveSubsetFonts="1" embedTrueTypeFonts="true">
+<p:presentation xmlns:a="http://schemas.openxmlformats.org/drawingml/2006/main" xmlns:r="http://schemas.openxmlformats.org/officeDocument/2006/relationships" xmlns:p="http://schemas.openxmlformats.org/presentationml/2006/main" embedTrueTypeFonts="1" saveSubsetFonts="1">
   <p:sldMasterIdLst>
     <p:sldMasterId id="2147483648" r:id="rId1"/>
   </p:sldMasterIdLst>
   <p:sldIdLst>
-    <p:sldId id="256" r:id="rId22"/>
-    <p:sldId id="257" r:id="rId23"/>
-    <p:sldId id="258" r:id="rId24"/>
-    <p:sldId id="259" r:id="rId25"/>
-    <p:sldId id="260" r:id="rId26"/>
-    <p:sldId id="261" r:id="rId27"/>
-    <p:sldId id="262" r:id="rId28"/>
-    <p:sldId id="263" r:id="rId29"/>
-    <p:sldId id="264" r:id="rId30"/>
-    <p:sldId id="265" r:id="rId31"/>
-    <p:sldId id="266" r:id="rId32"/>
-    <p:sldId id="267" r:id="rId33"/>
-    <p:sldId id="268" r:id="rId34"/>
-    <p:sldId id="269" r:id="rId35"/>
+    <p:sldId id="256" r:id="rId2"/>
+    <p:sldId id="257" r:id="rId3"/>
+    <p:sldId id="258" r:id="rId4"/>
+    <p:sldId id="259" r:id="rId5"/>
+    <p:sldId id="260" r:id="rId6"/>
+    <p:sldId id="261" r:id="rId7"/>
+    <p:sldId id="262" r:id="rId8"/>
+    <p:sldId id="263" r:id="rId9"/>
+    <p:sldId id="264" r:id="rId10"/>
+    <p:sldId id="265" r:id="rId11"/>
+    <p:sldId id="266" r:id="rId12"/>
+    <p:sldId id="267" r:id="rId13"/>
+    <p:sldId id="268" r:id="rId14"/>
+    <p:sldId id="269" r:id="rId15"/>
   </p:sldIdLst>
   <p:sldSz cx="18288000" cy="10287000"/>
   <p:notesSz cx="6858000" cy="9144000"/>
   <p:embeddedFontLst>
     <p:embeddedFont>
-      <p:font typeface="Raleway" charset="1" panose="020B0503030101060003"/>
-      <p:regular r:id="rId6"/>
-    </p:embeddedFont>
-    <p:embeddedFont>
-      <p:font typeface="Raleway Bold" charset="1" panose="020B0803030101060003"/>
-      <p:regular r:id="rId7"/>
-    </p:embeddedFont>
-    <p:embeddedFont>
-      <p:font typeface="Arimo" charset="1" panose="020B0604020202020204"/>
-      <p:regular r:id="rId8"/>
-    </p:embeddedFont>
-    <p:embeddedFont>
-      <p:font typeface="Arimo Bold" charset="1" panose="020B0704020202020204"/>
-      <p:regular r:id="rId9"/>
-    </p:embeddedFont>
-    <p:embeddedFont>
-      <p:font typeface="Arimo Italics" charset="1" panose="020B0604020202090204"/>
-      <p:regular r:id="rId10"/>
-    </p:embeddedFont>
-    <p:embeddedFont>
-      <p:font typeface="Arimo Bold Italics" charset="1" panose="020B0704020202090204"/>
-      <p:regular r:id="rId11"/>
-    </p:embeddedFont>
-    <p:embeddedFont>
-      <p:font typeface="Open Sans Light" charset="1" panose="020B0306030504020204"/>
-      <p:regular r:id="rId12"/>
-    </p:embeddedFont>
-    <p:embeddedFont>
-      <p:font typeface="Open Sans Light Bold" charset="1" panose="020B0806030504020204"/>
-      <p:regular r:id="rId13"/>
-    </p:embeddedFont>
-    <p:embeddedFont>
-      <p:font typeface="Open Sans Light Italics" charset="1" panose="020B0306030504020204"/>
-      <p:regular r:id="rId14"/>
-    </p:embeddedFont>
-    <p:embeddedFont>
-      <p:font typeface="Open Sans Light Bold Italics" charset="1" panose="020B0806030504020204"/>
-      <p:regular r:id="rId15"/>
-    </p:embeddedFont>
-    <p:embeddedFont>
-      <p:font typeface="Open Sans" charset="1" panose="020B0606030504020204"/>
+      <p:font typeface="Arimo" panose="020B0604020202020204" charset="0"/>
       <p:regular r:id="rId16"/>
     </p:embeddedFont>
     <p:embeddedFont>
-      <p:font typeface="Open Sans Bold" charset="1" panose="020B0806030504020204"/>
+      <p:font typeface="Arimo Bold" panose="020B0604020202020204" charset="0"/>
       <p:regular r:id="rId17"/>
     </p:embeddedFont>
     <p:embeddedFont>
-      <p:font typeface="Open Sans Italics" charset="1" panose="020B0606030504020204"/>
+      <p:font typeface="Calibri" panose="020F0502020204030204" pitchFamily="34" charset="0"/>
       <p:regular r:id="rId18"/>
+      <p:bold r:id="rId19"/>
+      <p:italic r:id="rId20"/>
+      <p:boldItalic r:id="rId21"/>
     </p:embeddedFont>
     <p:embeddedFont>
-      <p:font typeface="Open Sans Bold Italics" charset="1" panose="020B0806030504020204"/>
-      <p:regular r:id="rId19"/>
+      <p:font typeface="Open Sans" panose="020B0604020202020204" charset="0"/>
+      <p:regular r:id="rId22"/>
     </p:embeddedFont>
     <p:embeddedFont>
-      <p:font typeface="Open Sans Extra Bold" charset="1" panose="020B0906030804020204"/>
-      <p:regular r:id="rId20"/>
+      <p:font typeface="Open Sans Bold" panose="020B0604020202020204" charset="0"/>
+      <p:regular r:id="rId23"/>
     </p:embeddedFont>
     <p:embeddedFont>
-      <p:font typeface="Open Sans Extra Bold Italics" charset="1" panose="020B0906030804020204"/>
-      <p:regular r:id="rId21"/>
+      <p:font typeface="Open Sans Extra Bold" panose="020B0604020202020204" charset="0"/>
+      <p:regular r:id="rId24"/>
+    </p:embeddedFont>
+    <p:embeddedFont>
+      <p:font typeface="Open Sans Light Bold" panose="020B0604020202020204" charset="0"/>
+      <p:regular r:id="rId25"/>
+    </p:embeddedFont>
+    <p:embeddedFont>
+      <p:font typeface="Raleway Bold" pitchFamily="2" charset="0"/>
+      <p:regular r:id="rId26"/>
+      <p:bold r:id="rId27"/>
     </p:embeddedFont>
   </p:embeddedFontLst>
   <p:defaultTextStyle>
@@ -183,6 +155,22 @@
       </a:defRPr>
     </a:lvl9pPr>
   </p:defaultTextStyle>
+  <p:extLst>
+    <p:ext uri="{EFAFB233-063F-42B5-8137-9DF3F51BA10A}">
+      <p15:sldGuideLst xmlns:p15="http://schemas.microsoft.com/office/powerpoint/2012/main">
+        <p15:guide id="1" orient="horz" pos="2160">
+          <p15:clr>
+            <a:srgbClr val="A4A3A4"/>
+          </p15:clr>
+        </p15:guide>
+        <p15:guide id="2" pos="2880">
+          <p15:clr>
+            <a:srgbClr val="A4A3A4"/>
+          </p15:clr>
+        </p15:guide>
+      </p15:sldGuideLst>
+    </p:ext>
+  </p:extLst>
 </p:presentation>
 </file>
 
@@ -224,10 +212,9 @@
           <a:lstStyle/>
           <a:p>
             <a:r>
-              <a:rPr lang="en-US" smtClean="0"/>
+              <a:rPr lang="en-US"/>
               <a:t>Click to edit Master title style</a:t>
             </a:r>
-            <a:endParaRPr lang="en-US"/>
           </a:p>
         </p:txBody>
       </p:sp>
@@ -343,10 +330,9 @@
           </a:lstStyle>
           <a:p>
             <a:r>
-              <a:rPr lang="en-US" smtClean="0"/>
+              <a:rPr lang="en-US"/>
               <a:t>Click to edit Master subtitle style</a:t>
             </a:r>
-            <a:endParaRPr lang="en-US"/>
           </a:p>
         </p:txBody>
       </p:sp>
@@ -368,7 +354,7 @@
             <a:fld id="{1D8BD707-D9CF-40AE-B4C6-C98DA3205C09}" type="datetimeFigureOut">
               <a:rPr lang="en-US" smtClean="0"/>
               <a:pPr/>
-              <a:t>8/1/2011</a:t>
+              <a:t>8/3/2020</a:t>
             </a:fld>
             <a:endParaRPr lang="en-US"/>
           </a:p>
@@ -458,10 +444,9 @@
           <a:lstStyle/>
           <a:p>
             <a:r>
-              <a:rPr lang="en-US" smtClean="0"/>
+              <a:rPr lang="en-US"/>
               <a:t>Click to edit Master title style</a:t>
             </a:r>
-            <a:endParaRPr lang="en-US"/>
           </a:p>
         </p:txBody>
       </p:sp>
@@ -482,38 +467,37 @@
           <a:p>
             <a:pPr lvl="0"/>
             <a:r>
-              <a:rPr lang="en-US" smtClean="0"/>
+              <a:rPr lang="en-US"/>
               <a:t>Click to edit Master text styles</a:t>
             </a:r>
           </a:p>
           <a:p>
             <a:pPr lvl="1"/>
             <a:r>
-              <a:rPr lang="en-US" smtClean="0"/>
+              <a:rPr lang="en-US"/>
               <a:t>Second level</a:t>
             </a:r>
           </a:p>
           <a:p>
             <a:pPr lvl="2"/>
             <a:r>
-              <a:rPr lang="en-US" smtClean="0"/>
+              <a:rPr lang="en-US"/>
               <a:t>Third level</a:t>
             </a:r>
           </a:p>
           <a:p>
             <a:pPr lvl="3"/>
             <a:r>
-              <a:rPr lang="en-US" smtClean="0"/>
+              <a:rPr lang="en-US"/>
               <a:t>Fourth level</a:t>
             </a:r>
           </a:p>
           <a:p>
             <a:pPr lvl="4"/>
             <a:r>
-              <a:rPr lang="en-US" smtClean="0"/>
+              <a:rPr lang="en-US"/>
               <a:t>Fifth level</a:t>
             </a:r>
-            <a:endParaRPr lang="en-US"/>
           </a:p>
         </p:txBody>
       </p:sp>
@@ -535,7 +519,7 @@
             <a:fld id="{1D8BD707-D9CF-40AE-B4C6-C98DA3205C09}" type="datetimeFigureOut">
               <a:rPr lang="en-US" smtClean="0"/>
               <a:pPr/>
-              <a:t>8/1/2011</a:t>
+              <a:t>8/3/2020</a:t>
             </a:fld>
             <a:endParaRPr lang="en-US"/>
           </a:p>
@@ -630,10 +614,9 @@
           <a:lstStyle/>
           <a:p>
             <a:r>
-              <a:rPr lang="en-US" smtClean="0"/>
+              <a:rPr lang="en-US"/>
               <a:t>Click to edit Master title style</a:t>
             </a:r>
-            <a:endParaRPr lang="en-US"/>
           </a:p>
         </p:txBody>
       </p:sp>
@@ -659,38 +642,37 @@
           <a:p>
             <a:pPr lvl="0"/>
             <a:r>
-              <a:rPr lang="en-US" smtClean="0"/>
+              <a:rPr lang="en-US"/>
               <a:t>Click to edit Master text styles</a:t>
             </a:r>
           </a:p>
           <a:p>
             <a:pPr lvl="1"/>
             <a:r>
-              <a:rPr lang="en-US" smtClean="0"/>
+              <a:rPr lang="en-US"/>
               <a:t>Second level</a:t>
             </a:r>
           </a:p>
           <a:p>
             <a:pPr lvl="2"/>
             <a:r>
-              <a:rPr lang="en-US" smtClean="0"/>
+              <a:rPr lang="en-US"/>
               <a:t>Third level</a:t>
             </a:r>
           </a:p>
           <a:p>
             <a:pPr lvl="3"/>
             <a:r>
-              <a:rPr lang="en-US" smtClean="0"/>
+              <a:rPr lang="en-US"/>
               <a:t>Fourth level</a:t>
             </a:r>
           </a:p>
           <a:p>
             <a:pPr lvl="4"/>
             <a:r>
-              <a:rPr lang="en-US" smtClean="0"/>
+              <a:rPr lang="en-US"/>
               <a:t>Fifth level</a:t>
             </a:r>
-            <a:endParaRPr lang="en-US"/>
           </a:p>
         </p:txBody>
       </p:sp>
@@ -712,7 +694,7 @@
             <a:fld id="{1D8BD707-D9CF-40AE-B4C6-C98DA3205C09}" type="datetimeFigureOut">
               <a:rPr lang="en-US" smtClean="0"/>
               <a:pPr/>
-              <a:t>8/1/2011</a:t>
+              <a:t>8/3/2020</a:t>
             </a:fld>
             <a:endParaRPr lang="en-US"/>
           </a:p>
@@ -802,10 +784,9 @@
           <a:lstStyle/>
           <a:p>
             <a:r>
-              <a:rPr lang="en-US" smtClean="0"/>
+              <a:rPr lang="en-US"/>
               <a:t>Click to edit Master title style</a:t>
             </a:r>
-            <a:endParaRPr lang="en-US"/>
           </a:p>
         </p:txBody>
       </p:sp>
@@ -826,38 +807,37 @@
           <a:p>
             <a:pPr lvl="0"/>
             <a:r>
-              <a:rPr lang="en-US" smtClean="0"/>
+              <a:rPr lang="en-US"/>
               <a:t>Click to edit Master text styles</a:t>
             </a:r>
           </a:p>
           <a:p>
             <a:pPr lvl="1"/>
             <a:r>
-              <a:rPr lang="en-US" smtClean="0"/>
+              <a:rPr lang="en-US"/>
               <a:t>Second level</a:t>
             </a:r>
           </a:p>
           <a:p>
             <a:pPr lvl="2"/>
             <a:r>
-              <a:rPr lang="en-US" smtClean="0"/>
+              <a:rPr lang="en-US"/>
               <a:t>Third level</a:t>
             </a:r>
           </a:p>
           <a:p>
             <a:pPr lvl="3"/>
             <a:r>
-              <a:rPr lang="en-US" smtClean="0"/>
+              <a:rPr lang="en-US"/>
               <a:t>Fourth level</a:t>
             </a:r>
           </a:p>
           <a:p>
             <a:pPr lvl="4"/>
             <a:r>
-              <a:rPr lang="en-US" smtClean="0"/>
+              <a:rPr lang="en-US"/>
               <a:t>Fifth level</a:t>
             </a:r>
-            <a:endParaRPr lang="en-US"/>
           </a:p>
         </p:txBody>
       </p:sp>
@@ -879,7 +859,7 @@
             <a:fld id="{1D8BD707-D9CF-40AE-B4C6-C98DA3205C09}" type="datetimeFigureOut">
               <a:rPr lang="en-US" smtClean="0"/>
               <a:pPr/>
-              <a:t>8/1/2011</a:t>
+              <a:t>8/3/2020</a:t>
             </a:fld>
             <a:endParaRPr lang="en-US"/>
           </a:p>
@@ -978,10 +958,9 @@
           </a:lstStyle>
           <a:p>
             <a:r>
-              <a:rPr lang="en-US" smtClean="0"/>
+              <a:rPr lang="en-US"/>
               <a:t>Click to edit Master title style</a:t>
             </a:r>
-            <a:endParaRPr lang="en-US"/>
           </a:p>
         </p:txBody>
       </p:sp>
@@ -1098,7 +1077,7 @@
           <a:p>
             <a:pPr lvl="0"/>
             <a:r>
-              <a:rPr lang="en-US" smtClean="0"/>
+              <a:rPr lang="en-US"/>
               <a:t>Click to edit Master text styles</a:t>
             </a:r>
           </a:p>
@@ -1122,7 +1101,7 @@
             <a:fld id="{1D8BD707-D9CF-40AE-B4C6-C98DA3205C09}" type="datetimeFigureOut">
               <a:rPr lang="en-US" smtClean="0"/>
               <a:pPr/>
-              <a:t>8/1/2011</a:t>
+              <a:t>8/3/2020</a:t>
             </a:fld>
             <a:endParaRPr lang="en-US"/>
           </a:p>
@@ -1212,10 +1191,9 @@
           <a:lstStyle/>
           <a:p>
             <a:r>
-              <a:rPr lang="en-US" smtClean="0"/>
+              <a:rPr lang="en-US"/>
               <a:t>Click to edit Master title style</a:t>
             </a:r>
-            <a:endParaRPr lang="en-US"/>
           </a:p>
         </p:txBody>
       </p:sp>
@@ -1269,38 +1247,37 @@
           <a:p>
             <a:pPr lvl="0"/>
             <a:r>
-              <a:rPr lang="en-US" smtClean="0"/>
+              <a:rPr lang="en-US"/>
               <a:t>Click to edit Master text styles</a:t>
             </a:r>
           </a:p>
           <a:p>
             <a:pPr lvl="1"/>
             <a:r>
-              <a:rPr lang="en-US" smtClean="0"/>
+              <a:rPr lang="en-US"/>
               <a:t>Second level</a:t>
             </a:r>
           </a:p>
           <a:p>
             <a:pPr lvl="2"/>
             <a:r>
-              <a:rPr lang="en-US" smtClean="0"/>
+              <a:rPr lang="en-US"/>
               <a:t>Third level</a:t>
             </a:r>
           </a:p>
           <a:p>
             <a:pPr lvl="3"/>
             <a:r>
-              <a:rPr lang="en-US" smtClean="0"/>
+              <a:rPr lang="en-US"/>
               <a:t>Fourth level</a:t>
             </a:r>
           </a:p>
           <a:p>
             <a:pPr lvl="4"/>
             <a:r>
-              <a:rPr lang="en-US" smtClean="0"/>
+              <a:rPr lang="en-US"/>
               <a:t>Fifth level</a:t>
             </a:r>
-            <a:endParaRPr lang="en-US"/>
           </a:p>
         </p:txBody>
       </p:sp>
@@ -1354,38 +1331,37 @@
           <a:p>
             <a:pPr lvl="0"/>
             <a:r>
-              <a:rPr lang="en-US" smtClean="0"/>
+              <a:rPr lang="en-US"/>
               <a:t>Click to edit Master text styles</a:t>
             </a:r>
           </a:p>
           <a:p>
             <a:pPr lvl="1"/>
             <a:r>
-              <a:rPr lang="en-US" smtClean="0"/>
+              <a:rPr lang="en-US"/>
               <a:t>Second level</a:t>
             </a:r>
           </a:p>
           <a:p>
             <a:pPr lvl="2"/>
             <a:r>
-              <a:rPr lang="en-US" smtClean="0"/>
+              <a:rPr lang="en-US"/>
               <a:t>Third level</a:t>
             </a:r>
           </a:p>
           <a:p>
             <a:pPr lvl="3"/>
             <a:r>
-              <a:rPr lang="en-US" smtClean="0"/>
+              <a:rPr lang="en-US"/>
               <a:t>Fourth level</a:t>
             </a:r>
           </a:p>
           <a:p>
             <a:pPr lvl="4"/>
             <a:r>
-              <a:rPr lang="en-US" smtClean="0"/>
+              <a:rPr lang="en-US"/>
               <a:t>Fifth level</a:t>
             </a:r>
-            <a:endParaRPr lang="en-US"/>
           </a:p>
         </p:txBody>
       </p:sp>
@@ -1407,7 +1383,7 @@
             <a:fld id="{1D8BD707-D9CF-40AE-B4C6-C98DA3205C09}" type="datetimeFigureOut">
               <a:rPr lang="en-US" smtClean="0"/>
               <a:pPr/>
-              <a:t>8/1/2011</a:t>
+              <a:t>8/3/2020</a:t>
             </a:fld>
             <a:endParaRPr lang="en-US"/>
           </a:p>
@@ -1501,10 +1477,9 @@
           </a:lstStyle>
           <a:p>
             <a:r>
-              <a:rPr lang="en-US" smtClean="0"/>
+              <a:rPr lang="en-US"/>
               <a:t>Click to edit Master title style</a:t>
             </a:r>
-            <a:endParaRPr lang="en-US"/>
           </a:p>
         </p:txBody>
       </p:sp>
@@ -1567,7 +1542,7 @@
           <a:p>
             <a:pPr lvl="0"/>
             <a:r>
-              <a:rPr lang="en-US" smtClean="0"/>
+              <a:rPr lang="en-US"/>
               <a:t>Click to edit Master text styles</a:t>
             </a:r>
           </a:p>
@@ -1623,38 +1598,37 @@
           <a:p>
             <a:pPr lvl="0"/>
             <a:r>
-              <a:rPr lang="en-US" smtClean="0"/>
+              <a:rPr lang="en-US"/>
               <a:t>Click to edit Master text styles</a:t>
             </a:r>
           </a:p>
           <a:p>
             <a:pPr lvl="1"/>
             <a:r>
-              <a:rPr lang="en-US" smtClean="0"/>
+              <a:rPr lang="en-US"/>
               <a:t>Second level</a:t>
             </a:r>
           </a:p>
           <a:p>
             <a:pPr lvl="2"/>
             <a:r>
-              <a:rPr lang="en-US" smtClean="0"/>
+              <a:rPr lang="en-US"/>
               <a:t>Third level</a:t>
             </a:r>
           </a:p>
           <a:p>
             <a:pPr lvl="3"/>
             <a:r>
-              <a:rPr lang="en-US" smtClean="0"/>
+              <a:rPr lang="en-US"/>
               <a:t>Fourth level</a:t>
             </a:r>
           </a:p>
           <a:p>
             <a:pPr lvl="4"/>
             <a:r>
-              <a:rPr lang="en-US" smtClean="0"/>
+              <a:rPr lang="en-US"/>
               <a:t>Fifth level</a:t>
             </a:r>
-            <a:endParaRPr lang="en-US"/>
           </a:p>
         </p:txBody>
       </p:sp>
@@ -1717,7 +1691,7 @@
           <a:p>
             <a:pPr lvl="0"/>
             <a:r>
-              <a:rPr lang="en-US" smtClean="0"/>
+              <a:rPr lang="en-US"/>
               <a:t>Click to edit Master text styles</a:t>
             </a:r>
           </a:p>
@@ -1773,38 +1747,37 @@
           <a:p>
             <a:pPr lvl="0"/>
             <a:r>
-              <a:rPr lang="en-US" smtClean="0"/>
+              <a:rPr lang="en-US"/>
               <a:t>Click to edit Master text styles</a:t>
             </a:r>
           </a:p>
           <a:p>
             <a:pPr lvl="1"/>
             <a:r>
-              <a:rPr lang="en-US" smtClean="0"/>
+              <a:rPr lang="en-US"/>
               <a:t>Second level</a:t>
             </a:r>
           </a:p>
           <a:p>
             <a:pPr lvl="2"/>
             <a:r>
-              <a:rPr lang="en-US" smtClean="0"/>
+              <a:rPr lang="en-US"/>
               <a:t>Third level</a:t>
             </a:r>
           </a:p>
           <a:p>
             <a:pPr lvl="3"/>
             <a:r>
-              <a:rPr lang="en-US" smtClean="0"/>
+              <a:rPr lang="en-US"/>
               <a:t>Fourth level</a:t>
             </a:r>
           </a:p>
           <a:p>
             <a:pPr lvl="4"/>
             <a:r>
-              <a:rPr lang="en-US" smtClean="0"/>
+              <a:rPr lang="en-US"/>
               <a:t>Fifth level</a:t>
             </a:r>
-            <a:endParaRPr lang="en-US"/>
           </a:p>
         </p:txBody>
       </p:sp>
@@ -1826,7 +1799,7 @@
             <a:fld id="{1D8BD707-D9CF-40AE-B4C6-C98DA3205C09}" type="datetimeFigureOut">
               <a:rPr lang="en-US" smtClean="0"/>
               <a:pPr/>
-              <a:t>8/1/2011</a:t>
+              <a:t>8/3/2020</a:t>
             </a:fld>
             <a:endParaRPr lang="en-US"/>
           </a:p>
@@ -1916,10 +1889,9 @@
           <a:lstStyle/>
           <a:p>
             <a:r>
-              <a:rPr lang="en-US" smtClean="0"/>
+              <a:rPr lang="en-US"/>
               <a:t>Click to edit Master title style</a:t>
             </a:r>
-            <a:endParaRPr lang="en-US"/>
           </a:p>
         </p:txBody>
       </p:sp>
@@ -1941,7 +1913,7 @@
             <a:fld id="{1D8BD707-D9CF-40AE-B4C6-C98DA3205C09}" type="datetimeFigureOut">
               <a:rPr lang="en-US" smtClean="0"/>
               <a:pPr/>
-              <a:t>8/1/2011</a:t>
+              <a:t>8/3/2020</a:t>
             </a:fld>
             <a:endParaRPr lang="en-US"/>
           </a:p>
@@ -2033,7 +2005,7 @@
             <a:fld id="{1D8BD707-D9CF-40AE-B4C6-C98DA3205C09}" type="datetimeFigureOut">
               <a:rPr lang="en-US" smtClean="0"/>
               <a:pPr/>
-              <a:t>8/1/2011</a:t>
+              <a:t>8/3/2020</a:t>
             </a:fld>
             <a:endParaRPr lang="en-US"/>
           </a:p>
@@ -2132,10 +2104,9 @@
           </a:lstStyle>
           <a:p>
             <a:r>
-              <a:rPr lang="en-US" smtClean="0"/>
+              <a:rPr lang="en-US"/>
               <a:t>Click to edit Master title style</a:t>
             </a:r>
-            <a:endParaRPr lang="en-US"/>
           </a:p>
         </p:txBody>
       </p:sp>
@@ -2189,38 +2160,37 @@
           <a:p>
             <a:pPr lvl="0"/>
             <a:r>
-              <a:rPr lang="en-US" smtClean="0"/>
+              <a:rPr lang="en-US"/>
               <a:t>Click to edit Master text styles</a:t>
             </a:r>
           </a:p>
           <a:p>
             <a:pPr lvl="1"/>
             <a:r>
-              <a:rPr lang="en-US" smtClean="0"/>
+              <a:rPr lang="en-US"/>
               <a:t>Second level</a:t>
             </a:r>
           </a:p>
           <a:p>
             <a:pPr lvl="2"/>
             <a:r>
-              <a:rPr lang="en-US" smtClean="0"/>
+              <a:rPr lang="en-US"/>
               <a:t>Third level</a:t>
             </a:r>
           </a:p>
           <a:p>
             <a:pPr lvl="3"/>
             <a:r>
-              <a:rPr lang="en-US" smtClean="0"/>
+              <a:rPr lang="en-US"/>
               <a:t>Fourth level</a:t>
             </a:r>
           </a:p>
           <a:p>
             <a:pPr lvl="4"/>
             <a:r>
-              <a:rPr lang="en-US" smtClean="0"/>
+              <a:rPr lang="en-US"/>
               <a:t>Fifth level</a:t>
             </a:r>
-            <a:endParaRPr lang="en-US"/>
           </a:p>
         </p:txBody>
       </p:sp>
@@ -2283,7 +2253,7 @@
           <a:p>
             <a:pPr lvl="0"/>
             <a:r>
-              <a:rPr lang="en-US" smtClean="0"/>
+              <a:rPr lang="en-US"/>
               <a:t>Click to edit Master text styles</a:t>
             </a:r>
           </a:p>
@@ -2307,7 +2277,7 @@
             <a:fld id="{1D8BD707-D9CF-40AE-B4C6-C98DA3205C09}" type="datetimeFigureOut">
               <a:rPr lang="en-US" smtClean="0"/>
               <a:pPr/>
-              <a:t>8/1/2011</a:t>
+              <a:t>8/3/2020</a:t>
             </a:fld>
             <a:endParaRPr lang="en-US"/>
           </a:p>
@@ -2406,10 +2376,9 @@
           </a:lstStyle>
           <a:p>
             <a:r>
-              <a:rPr lang="en-US" smtClean="0"/>
+              <a:rPr lang="en-US"/>
               <a:t>Click to edit Master title style</a:t>
             </a:r>
-            <a:endParaRPr lang="en-US"/>
           </a:p>
         </p:txBody>
       </p:sp>
@@ -2533,7 +2502,7 @@
           <a:p>
             <a:pPr lvl="0"/>
             <a:r>
-              <a:rPr lang="en-US" smtClean="0"/>
+              <a:rPr lang="en-US"/>
               <a:t>Click to edit Master text styles</a:t>
             </a:r>
           </a:p>
@@ -2557,7 +2526,7 @@
             <a:fld id="{1D8BD707-D9CF-40AE-B4C6-C98DA3205C09}" type="datetimeFigureOut">
               <a:rPr lang="en-US" smtClean="0"/>
               <a:pPr/>
-              <a:t>8/1/2011</a:t>
+              <a:t>8/3/2020</a:t>
             </a:fld>
             <a:endParaRPr lang="en-US"/>
           </a:p>
@@ -2662,10 +2631,9 @@
           <a:lstStyle/>
           <a:p>
             <a:r>
-              <a:rPr lang="en-US" smtClean="0"/>
+              <a:rPr lang="en-US"/>
               <a:t>Click to edit Master title style</a:t>
             </a:r>
-            <a:endParaRPr lang="en-US"/>
           </a:p>
         </p:txBody>
       </p:sp>
@@ -2696,38 +2664,37 @@
           <a:p>
             <a:pPr lvl="0"/>
             <a:r>
-              <a:rPr lang="en-US" smtClean="0"/>
+              <a:rPr lang="en-US"/>
               <a:t>Click to edit Master text styles</a:t>
             </a:r>
           </a:p>
           <a:p>
             <a:pPr lvl="1"/>
             <a:r>
-              <a:rPr lang="en-US" smtClean="0"/>
+              <a:rPr lang="en-US"/>
               <a:t>Second level</a:t>
             </a:r>
           </a:p>
           <a:p>
             <a:pPr lvl="2"/>
             <a:r>
-              <a:rPr lang="en-US" smtClean="0"/>
+              <a:rPr lang="en-US"/>
               <a:t>Third level</a:t>
             </a:r>
           </a:p>
           <a:p>
             <a:pPr lvl="3"/>
             <a:r>
-              <a:rPr lang="en-US" smtClean="0"/>
+              <a:rPr lang="en-US"/>
               <a:t>Fourth level</a:t>
             </a:r>
           </a:p>
           <a:p>
             <a:pPr lvl="4"/>
             <a:r>
-              <a:rPr lang="en-US" smtClean="0"/>
+              <a:rPr lang="en-US"/>
               <a:t>Fifth level</a:t>
             </a:r>
-            <a:endParaRPr lang="en-US"/>
           </a:p>
         </p:txBody>
       </p:sp>
@@ -2767,7 +2734,7 @@
             <a:fld id="{1D8BD707-D9CF-40AE-B4C6-C98DA3205C09}" type="datetimeFigureOut">
               <a:rPr lang="en-US" smtClean="0"/>
               <a:pPr/>
-              <a:t>8/1/2011</a:t>
+              <a:t>8/3/2020</a:t>
             </a:fld>
             <a:endParaRPr lang="en-US"/>
           </a:p>
@@ -3122,7 +3089,7 @@
 </file>
 
 <file path=ppt/slides/slide1.xml><?xml version="1.0" encoding="utf-8"?>
-<p:sld xmlns:p="http://schemas.openxmlformats.org/presentationml/2006/main" xmlns:a="http://schemas.openxmlformats.org/drawingml/2006/main" xmlns:r="http://schemas.openxmlformats.org/officeDocument/2006/relationships">
+<p:sld xmlns:a="http://schemas.openxmlformats.org/drawingml/2006/main" xmlns:r="http://schemas.openxmlformats.org/officeDocument/2006/relationships" xmlns:p="http://schemas.openxmlformats.org/presentationml/2006/main">
   <p:cSld>
     <p:spTree>
       <p:nvGrpSpPr>
@@ -3140,21 +3107,21 @@
       </p:grpSpPr>
       <p:grpSp>
         <p:nvGrpSpPr>
-          <p:cNvPr name="Group 2" id="2"/>
+          <p:cNvPr id="2" name="Group 2"/>
           <p:cNvGrpSpPr/>
           <p:nvPr/>
         </p:nvGrpSpPr>
         <p:grpSpPr>
-          <a:xfrm rot="0">
-            <a:off x="-399792" y="-203994"/>
-            <a:ext cx="19427467" cy="5008143"/>
+          <a:xfrm>
+            <a:off x="-1" y="-203994"/>
+            <a:ext cx="18288001" cy="5008143"/>
             <a:chOff x="0" y="0"/>
             <a:chExt cx="5629405" cy="1451186"/>
           </a:xfrm>
         </p:grpSpPr>
         <p:sp>
           <p:nvSpPr>
-            <p:cNvPr name="Freeform 3" id="3"/>
+            <p:cNvPr id="3" name="Freeform 3"/>
             <p:cNvSpPr/>
             <p:nvPr/>
           </p:nvSpPr>
@@ -3168,9 +3135,9 @@
               <a:gdLst/>
               <a:ahLst/>
               <a:cxnLst/>
-              <a:rect r="r" b="b" t="t" l="l"/>
+              <a:rect l="l" t="t" r="r" b="b"/>
               <a:pathLst>
-                <a:path h="1451186" w="5629406">
+                <a:path w="5629406" h="1451186">
                   <a:moveTo>
                     <a:pt x="0" y="0"/>
                   </a:moveTo>
@@ -3195,21 +3162,21 @@
       </p:grpSp>
       <p:pic>
         <p:nvPicPr>
-          <p:cNvPr name="Picture 4" id="4"/>
+          <p:cNvPr id="4" name="Picture 4"/>
           <p:cNvPicPr>
-            <a:picLocks noChangeAspect="true"/>
+            <a:picLocks noChangeAspect="1"/>
           </p:cNvPicPr>
           <p:nvPr/>
         </p:nvPicPr>
         <p:blipFill>
           <a:blip r:embed="rId2"/>
-          <a:srcRect l="0" t="0" r="0" b="0"/>
+          <a:srcRect/>
           <a:stretch>
             <a:fillRect/>
           </a:stretch>
         </p:blipFill>
         <p:spPr>
-          <a:xfrm flipH="false" flipV="false" rot="0">
+          <a:xfrm>
             <a:off x="259456" y="348626"/>
             <a:ext cx="13708378" cy="4038260"/>
           </a:xfrm>
@@ -3220,21 +3187,21 @@
       </p:pic>
       <p:pic>
         <p:nvPicPr>
-          <p:cNvPr name="Picture 5" id="5"/>
+          <p:cNvPr id="5" name="Picture 5"/>
           <p:cNvPicPr>
-            <a:picLocks noChangeAspect="true"/>
+            <a:picLocks noChangeAspect="1"/>
           </p:cNvPicPr>
           <p:nvPr/>
         </p:nvPicPr>
         <p:blipFill>
           <a:blip r:embed="rId3"/>
-          <a:srcRect l="0" t="0" r="0" b="0"/>
+          <a:srcRect/>
           <a:stretch>
             <a:fillRect/>
           </a:stretch>
         </p:blipFill>
         <p:spPr>
-          <a:xfrm flipH="false" flipV="false" rot="0">
+          <a:xfrm>
             <a:off x="1517979" y="7164708"/>
             <a:ext cx="8964898" cy="2588581"/>
           </a:xfrm>
@@ -3245,21 +3212,21 @@
       </p:pic>
       <p:pic>
         <p:nvPicPr>
-          <p:cNvPr name="Picture 6" id="6"/>
+          <p:cNvPr id="6" name="Picture 6"/>
           <p:cNvPicPr>
-            <a:picLocks noChangeAspect="true"/>
+            <a:picLocks noChangeAspect="1"/>
           </p:cNvPicPr>
           <p:nvPr/>
         </p:nvPicPr>
         <p:blipFill>
           <a:blip r:embed="rId4"/>
-          <a:srcRect l="0" t="0" r="0" b="0"/>
+          <a:srcRect/>
           <a:stretch>
             <a:fillRect/>
           </a:stretch>
         </p:blipFill>
         <p:spPr>
-          <a:xfrm flipH="false" flipV="false" rot="0">
+          <a:xfrm>
             <a:off x="11865505" y="7164708"/>
             <a:ext cx="2439327" cy="2573602"/>
           </a:xfrm>
@@ -3270,12 +3237,12 @@
       </p:pic>
       <p:sp>
         <p:nvSpPr>
-          <p:cNvPr name="TextBox 7" id="7"/>
-          <p:cNvSpPr txBox="true"/>
+          <p:cNvPr id="7" name="TextBox 7"/>
+          <p:cNvSpPr txBox="1"/>
           <p:nvPr/>
         </p:nvSpPr>
         <p:spPr>
-          <a:xfrm rot="0">
+          <a:xfrm>
             <a:off x="468962" y="4981575"/>
             <a:ext cx="14439900" cy="1533525"/>
           </a:xfrm>
@@ -3284,7 +3251,7 @@
           </a:prstGeom>
         </p:spPr>
         <p:txBody>
-          <a:bodyPr anchor="t" rtlCol="false" tIns="0" lIns="0" bIns="0" rIns="0">
+          <a:bodyPr lIns="0" tIns="0" rIns="0" bIns="0" rtlCol="0" anchor="t">
             <a:spAutoFit/>
           </a:bodyPr>
           <a:lstStyle/>
@@ -3301,16 +3268,7 @@
                 </a:solidFill>
                 <a:latin typeface="Open Sans Extra Bold"/>
               </a:rPr>
-              <a:t>NM391</a:t>
-            </a:r>
-            <a:r>
-              <a:rPr lang="en-US" sz="9000">
-                <a:solidFill>
-                  <a:srgbClr val="000000"/>
-                </a:solidFill>
-                <a:latin typeface="Open Sans Extra Bold"/>
-              </a:rPr>
-              <a:t> The Ones n Zeros</a:t>
+              <a:t>NM391 The Ones n Zeros</a:t>
             </a:r>
           </a:p>
         </p:txBody>
@@ -3324,7 +3282,7 @@
 </file>
 
 <file path=ppt/slides/slide10.xml><?xml version="1.0" encoding="utf-8"?>
-<p:sld xmlns:p="http://schemas.openxmlformats.org/presentationml/2006/main" xmlns:a="http://schemas.openxmlformats.org/drawingml/2006/main" xmlns:r="http://schemas.openxmlformats.org/officeDocument/2006/relationships">
+<p:sld xmlns:a="http://schemas.openxmlformats.org/drawingml/2006/main" xmlns:r="http://schemas.openxmlformats.org/officeDocument/2006/relationships" xmlns:p="http://schemas.openxmlformats.org/presentationml/2006/main">
   <p:cSld>
     <p:spTree>
       <p:nvGrpSpPr>
@@ -3342,12 +3300,12 @@
       </p:grpSpPr>
       <p:grpSp>
         <p:nvGrpSpPr>
-          <p:cNvPr name="Group 2" id="2"/>
+          <p:cNvPr id="2" name="Group 2"/>
           <p:cNvGrpSpPr/>
           <p:nvPr/>
         </p:nvGrpSpPr>
         <p:grpSpPr>
-          <a:xfrm rot="0">
+          <a:xfrm>
             <a:off x="-399792" y="-203994"/>
             <a:ext cx="19427467" cy="2097967"/>
             <a:chOff x="0" y="0"/>
@@ -3356,7 +3314,7 @@
         </p:grpSpPr>
         <p:sp>
           <p:nvSpPr>
-            <p:cNvPr name="Freeform 3" id="3"/>
+            <p:cNvPr id="3" name="Freeform 3"/>
             <p:cNvSpPr/>
             <p:nvPr/>
           </p:nvSpPr>
@@ -3370,9 +3328,9 @@
               <a:gdLst/>
               <a:ahLst/>
               <a:cxnLst/>
-              <a:rect r="r" b="b" t="t" l="l"/>
+              <a:rect l="l" t="t" r="r" b="b"/>
               <a:pathLst>
-                <a:path h="607918" w="5629406">
+                <a:path w="5629406" h="607918">
                   <a:moveTo>
                     <a:pt x="0" y="0"/>
                   </a:moveTo>
@@ -3397,21 +3355,21 @@
       </p:grpSp>
       <p:pic>
         <p:nvPicPr>
-          <p:cNvPr name="Picture 4" id="4"/>
+          <p:cNvPr id="4" name="Picture 4"/>
           <p:cNvPicPr>
-            <a:picLocks noChangeAspect="true"/>
+            <a:picLocks noChangeAspect="1"/>
           </p:cNvPicPr>
           <p:nvPr/>
         </p:nvPicPr>
         <p:blipFill>
           <a:blip r:embed="rId2"/>
-          <a:srcRect l="0" t="0" r="0" b="0"/>
+          <a:srcRect/>
           <a:stretch>
             <a:fillRect/>
           </a:stretch>
         </p:blipFill>
         <p:spPr>
-          <a:xfrm flipH="false" flipV="false" rot="0">
+          <a:xfrm>
             <a:off x="1630606" y="2324798"/>
             <a:ext cx="3181968" cy="2954059"/>
           </a:xfrm>
@@ -3422,21 +3380,21 @@
       </p:pic>
       <p:pic>
         <p:nvPicPr>
-          <p:cNvPr name="Picture 5" id="5"/>
+          <p:cNvPr id="5" name="Picture 5"/>
           <p:cNvPicPr>
-            <a:picLocks noChangeAspect="true"/>
+            <a:picLocks noChangeAspect="1"/>
           </p:cNvPicPr>
           <p:nvPr/>
         </p:nvPicPr>
         <p:blipFill>
           <a:blip r:embed="rId3"/>
-          <a:srcRect l="0" t="0" r="0" b="0"/>
+          <a:srcRect/>
           <a:stretch>
             <a:fillRect/>
           </a:stretch>
         </p:blipFill>
         <p:spPr>
-          <a:xfrm flipH="false" flipV="false" rot="0">
+          <a:xfrm>
             <a:off x="5717002" y="2324798"/>
             <a:ext cx="3165063" cy="2954059"/>
           </a:xfrm>
@@ -3447,21 +3405,21 @@
       </p:pic>
       <p:pic>
         <p:nvPicPr>
-          <p:cNvPr name="Picture 6" id="6"/>
+          <p:cNvPr id="6" name="Picture 6"/>
           <p:cNvPicPr>
-            <a:picLocks noChangeAspect="true"/>
+            <a:picLocks noChangeAspect="1"/>
           </p:cNvPicPr>
           <p:nvPr/>
         </p:nvPicPr>
         <p:blipFill>
           <a:blip r:embed="rId4"/>
-          <a:srcRect l="0" t="0" r="0" b="0"/>
+          <a:srcRect/>
           <a:stretch>
             <a:fillRect/>
           </a:stretch>
         </p:blipFill>
         <p:spPr>
-          <a:xfrm flipH="false" flipV="false" rot="0">
+          <a:xfrm>
             <a:off x="9748859" y="2324798"/>
             <a:ext cx="3165063" cy="2954059"/>
           </a:xfrm>
@@ -3472,21 +3430,21 @@
       </p:pic>
       <p:pic>
         <p:nvPicPr>
-          <p:cNvPr name="Picture 7" id="7"/>
+          <p:cNvPr id="7" name="Picture 7"/>
           <p:cNvPicPr>
-            <a:picLocks noChangeAspect="true"/>
+            <a:picLocks noChangeAspect="1"/>
           </p:cNvPicPr>
           <p:nvPr/>
         </p:nvPicPr>
         <p:blipFill>
           <a:blip r:embed="rId5"/>
-          <a:srcRect l="0" t="0" r="0" b="0"/>
+          <a:srcRect/>
           <a:stretch>
             <a:fillRect/>
           </a:stretch>
         </p:blipFill>
         <p:spPr>
-          <a:xfrm flipH="false" flipV="false" rot="0">
+          <a:xfrm>
             <a:off x="13492331" y="2324798"/>
             <a:ext cx="3165063" cy="2954059"/>
           </a:xfrm>
@@ -3497,21 +3455,21 @@
       </p:pic>
       <p:pic>
         <p:nvPicPr>
-          <p:cNvPr name="Picture 8" id="8"/>
+          <p:cNvPr id="8" name="Picture 8"/>
           <p:cNvPicPr>
-            <a:picLocks noChangeAspect="true"/>
+            <a:picLocks noChangeAspect="1"/>
           </p:cNvPicPr>
           <p:nvPr/>
         </p:nvPicPr>
         <p:blipFill>
           <a:blip r:embed="rId6"/>
-          <a:srcRect l="0" t="0" r="0" b="0"/>
+          <a:srcRect/>
           <a:stretch>
             <a:fillRect/>
           </a:stretch>
         </p:blipFill>
         <p:spPr>
-          <a:xfrm flipH="false" flipV="false" rot="0">
+          <a:xfrm>
             <a:off x="1647511" y="6304241"/>
             <a:ext cx="3165063" cy="2954059"/>
           </a:xfrm>
@@ -3522,21 +3480,21 @@
       </p:pic>
       <p:pic>
         <p:nvPicPr>
-          <p:cNvPr name="Picture 9" id="9"/>
+          <p:cNvPr id="9" name="Picture 9"/>
           <p:cNvPicPr>
-            <a:picLocks noChangeAspect="true"/>
+            <a:picLocks noChangeAspect="1"/>
           </p:cNvPicPr>
           <p:nvPr/>
         </p:nvPicPr>
         <p:blipFill>
           <a:blip r:embed="rId7"/>
-          <a:srcRect l="0" t="0" r="0" b="0"/>
+          <a:srcRect/>
           <a:stretch>
             <a:fillRect/>
           </a:stretch>
         </p:blipFill>
         <p:spPr>
-          <a:xfrm flipH="false" flipV="false" rot="0">
+          <a:xfrm>
             <a:off x="5717002" y="6304241"/>
             <a:ext cx="3165063" cy="2954059"/>
           </a:xfrm>
@@ -3547,21 +3505,21 @@
       </p:pic>
       <p:pic>
         <p:nvPicPr>
-          <p:cNvPr name="Picture 10" id="10"/>
+          <p:cNvPr id="10" name="Picture 10"/>
           <p:cNvPicPr>
-            <a:picLocks noChangeAspect="true"/>
+            <a:picLocks noChangeAspect="1"/>
           </p:cNvPicPr>
           <p:nvPr/>
         </p:nvPicPr>
         <p:blipFill>
           <a:blip r:embed="rId8"/>
-          <a:srcRect l="0" t="0" r="0" b="0"/>
+          <a:srcRect/>
           <a:stretch>
             <a:fillRect/>
           </a:stretch>
         </p:blipFill>
         <p:spPr>
-          <a:xfrm flipH="false" flipV="false" rot="0">
+          <a:xfrm>
             <a:off x="9748859" y="6304241"/>
             <a:ext cx="3165063" cy="2954059"/>
           </a:xfrm>
@@ -3572,21 +3530,21 @@
       </p:pic>
       <p:pic>
         <p:nvPicPr>
-          <p:cNvPr name="Picture 11" id="11"/>
+          <p:cNvPr id="11" name="Picture 11"/>
           <p:cNvPicPr>
-            <a:picLocks noChangeAspect="true"/>
+            <a:picLocks noChangeAspect="1"/>
           </p:cNvPicPr>
           <p:nvPr/>
         </p:nvPicPr>
         <p:blipFill>
           <a:blip r:embed="rId9"/>
-          <a:srcRect l="0" t="0" r="0" b="0"/>
+          <a:srcRect/>
           <a:stretch>
             <a:fillRect/>
           </a:stretch>
         </p:blipFill>
         <p:spPr>
-          <a:xfrm flipH="false" flipV="false" rot="0">
+          <a:xfrm>
             <a:off x="13492331" y="6304241"/>
             <a:ext cx="3181968" cy="2954059"/>
           </a:xfrm>
@@ -3597,21 +3555,21 @@
       </p:pic>
       <p:sp>
         <p:nvSpPr>
-          <p:cNvPr name="TextBox 12" id="12"/>
-          <p:cNvSpPr txBox="true"/>
+          <p:cNvPr id="12" name="TextBox 12"/>
+          <p:cNvSpPr txBox="1"/>
           <p:nvPr/>
         </p:nvSpPr>
         <p:spPr>
-          <a:xfrm rot="0">
+          <a:xfrm>
             <a:off x="1028700" y="190500"/>
-            <a:ext cx="3758803" cy="1368425"/>
+            <a:ext cx="5372100" cy="1368425"/>
           </a:xfrm>
           <a:prstGeom prst="rect">
             <a:avLst/>
           </a:prstGeom>
         </p:spPr>
         <p:txBody>
-          <a:bodyPr anchor="t" rtlCol="false" tIns="0" lIns="0" bIns="0" rIns="0">
+          <a:bodyPr wrap="square" lIns="0" tIns="0" rIns="0" bIns="0" rtlCol="0" anchor="t">
             <a:spAutoFit/>
           </a:bodyPr>
           <a:lstStyle/>
@@ -3622,7 +3580,7 @@
               </a:lnSpc>
             </a:pPr>
             <a:r>
-              <a:rPr lang="en-US" sz="8000">
+              <a:rPr lang="en-US" sz="8000" dirty="0">
                 <a:solidFill>
                   <a:srgbClr val="FFFFFF"/>
                 </a:solidFill>
@@ -3635,12 +3593,12 @@
       </p:sp>
       <p:sp>
         <p:nvSpPr>
-          <p:cNvPr name="TextBox 13" id="13"/>
-          <p:cNvSpPr txBox="true"/>
+          <p:cNvPr id="13" name="TextBox 13"/>
+          <p:cNvSpPr txBox="1"/>
           <p:nvPr/>
         </p:nvSpPr>
         <p:spPr>
-          <a:xfrm rot="0">
+          <a:xfrm>
             <a:off x="2877127" y="5481963"/>
             <a:ext cx="688925" cy="349250"/>
           </a:xfrm>
@@ -3649,7 +3607,7 @@
           </a:prstGeom>
         </p:spPr>
         <p:txBody>
-          <a:bodyPr anchor="t" rtlCol="false" tIns="0" lIns="0" bIns="0" rIns="0">
+          <a:bodyPr lIns="0" tIns="0" rIns="0" bIns="0" rtlCol="0" anchor="t">
             <a:spAutoFit/>
           </a:bodyPr>
           <a:lstStyle/>
@@ -3673,12 +3631,12 @@
       </p:sp>
       <p:sp>
         <p:nvSpPr>
-          <p:cNvPr name="TextBox 14" id="14"/>
-          <p:cNvSpPr txBox="true"/>
+          <p:cNvPr id="14" name="TextBox 14"/>
+          <p:cNvSpPr txBox="1"/>
           <p:nvPr/>
         </p:nvSpPr>
         <p:spPr>
-          <a:xfrm rot="0">
+          <a:xfrm>
             <a:off x="5819215" y="5305751"/>
             <a:ext cx="2960638" cy="701675"/>
           </a:xfrm>
@@ -3687,7 +3645,7 @@
           </a:prstGeom>
         </p:spPr>
         <p:txBody>
-          <a:bodyPr anchor="t" rtlCol="false" tIns="0" lIns="0" bIns="0" rIns="0">
+          <a:bodyPr lIns="0" tIns="0" rIns="0" bIns="0" rtlCol="0" anchor="t">
             <a:spAutoFit/>
           </a:bodyPr>
           <a:lstStyle/>
@@ -3727,12 +3685,12 @@
       </p:sp>
       <p:sp>
         <p:nvSpPr>
-          <p:cNvPr name="TextBox 15" id="15"/>
-          <p:cNvSpPr txBox="true"/>
+          <p:cNvPr id="15" name="TextBox 15"/>
+          <p:cNvSpPr txBox="1"/>
           <p:nvPr/>
         </p:nvSpPr>
         <p:spPr>
-          <a:xfrm rot="0">
+          <a:xfrm>
             <a:off x="9431302" y="5305751"/>
             <a:ext cx="3800177" cy="701675"/>
           </a:xfrm>
@@ -3741,7 +3699,7 @@
           </a:prstGeom>
         </p:spPr>
         <p:txBody>
-          <a:bodyPr anchor="t" rtlCol="false" tIns="0" lIns="0" bIns="0" rIns="0">
+          <a:bodyPr lIns="0" tIns="0" rIns="0" bIns="0" rtlCol="0" anchor="t">
             <a:spAutoFit/>
           </a:bodyPr>
           <a:lstStyle/>
@@ -3781,12 +3739,12 @@
       </p:sp>
       <p:sp>
         <p:nvSpPr>
-          <p:cNvPr name="TextBox 16" id="16"/>
-          <p:cNvSpPr txBox="true"/>
+          <p:cNvPr id="16" name="TextBox 16"/>
+          <p:cNvSpPr txBox="1"/>
           <p:nvPr/>
         </p:nvSpPr>
         <p:spPr>
-          <a:xfrm rot="0">
+          <a:xfrm>
             <a:off x="13557901" y="5481963"/>
             <a:ext cx="3050828" cy="349250"/>
           </a:xfrm>
@@ -3795,7 +3753,7 @@
           </a:prstGeom>
         </p:spPr>
         <p:txBody>
-          <a:bodyPr anchor="t" rtlCol="false" tIns="0" lIns="0" bIns="0" rIns="0">
+          <a:bodyPr lIns="0" tIns="0" rIns="0" bIns="0" rtlCol="0" anchor="t">
             <a:spAutoFit/>
           </a:bodyPr>
           <a:lstStyle/>
@@ -3819,12 +3777,12 @@
       </p:sp>
       <p:sp>
         <p:nvSpPr>
-          <p:cNvPr name="TextBox 17" id="17"/>
-          <p:cNvSpPr txBox="true"/>
+          <p:cNvPr id="17" name="TextBox 17"/>
+          <p:cNvSpPr txBox="1"/>
           <p:nvPr/>
         </p:nvSpPr>
         <p:spPr>
-          <a:xfrm rot="0">
+          <a:xfrm>
             <a:off x="1737669" y="9368163"/>
             <a:ext cx="2984748" cy="349250"/>
           </a:xfrm>
@@ -3833,7 +3791,7 @@
           </a:prstGeom>
         </p:spPr>
         <p:txBody>
-          <a:bodyPr anchor="t" rtlCol="false" tIns="0" lIns="0" bIns="0" rIns="0">
+          <a:bodyPr lIns="0" tIns="0" rIns="0" bIns="0" rtlCol="0" anchor="t">
             <a:spAutoFit/>
           </a:bodyPr>
           <a:lstStyle/>
@@ -3857,12 +3815,12 @@
       </p:sp>
       <p:sp>
         <p:nvSpPr>
-          <p:cNvPr name="TextBox 18" id="18"/>
-          <p:cNvSpPr txBox="true"/>
+          <p:cNvPr id="18" name="TextBox 18"/>
+          <p:cNvSpPr txBox="1"/>
           <p:nvPr/>
         </p:nvSpPr>
         <p:spPr>
-          <a:xfrm rot="0">
+          <a:xfrm>
             <a:off x="5807160" y="9368163"/>
             <a:ext cx="2984748" cy="349250"/>
           </a:xfrm>
@@ -3871,7 +3829,7 @@
           </a:prstGeom>
         </p:spPr>
         <p:txBody>
-          <a:bodyPr anchor="t" rtlCol="false" tIns="0" lIns="0" bIns="0" rIns="0">
+          <a:bodyPr lIns="0" tIns="0" rIns="0" bIns="0" rtlCol="0" anchor="t">
             <a:spAutoFit/>
           </a:bodyPr>
           <a:lstStyle/>
@@ -3895,12 +3853,12 @@
       </p:sp>
       <p:sp>
         <p:nvSpPr>
-          <p:cNvPr name="TextBox 19" id="19"/>
-          <p:cNvSpPr txBox="true"/>
+          <p:cNvPr id="19" name="TextBox 19"/>
+          <p:cNvSpPr txBox="1"/>
           <p:nvPr/>
         </p:nvSpPr>
         <p:spPr>
-          <a:xfrm rot="0">
+          <a:xfrm>
             <a:off x="9805976" y="9368163"/>
             <a:ext cx="3050828" cy="349250"/>
           </a:xfrm>
@@ -3909,7 +3867,7 @@
           </a:prstGeom>
         </p:spPr>
         <p:txBody>
-          <a:bodyPr anchor="t" rtlCol="false" tIns="0" lIns="0" bIns="0" rIns="0">
+          <a:bodyPr lIns="0" tIns="0" rIns="0" bIns="0" rtlCol="0" anchor="t">
             <a:spAutoFit/>
           </a:bodyPr>
           <a:lstStyle/>
@@ -3933,12 +3891,12 @@
       </p:sp>
       <p:sp>
         <p:nvSpPr>
-          <p:cNvPr name="TextBox 20" id="20"/>
-          <p:cNvSpPr txBox="true"/>
+          <p:cNvPr id="20" name="TextBox 20"/>
+          <p:cNvSpPr txBox="1"/>
           <p:nvPr/>
         </p:nvSpPr>
         <p:spPr>
-          <a:xfrm rot="0">
+          <a:xfrm>
             <a:off x="13648835" y="9368163"/>
             <a:ext cx="2868960" cy="701675"/>
           </a:xfrm>
@@ -3947,7 +3905,7 @@
           </a:prstGeom>
         </p:spPr>
         <p:txBody>
-          <a:bodyPr anchor="t" rtlCol="false" tIns="0" lIns="0" bIns="0" rIns="0">
+          <a:bodyPr lIns="0" tIns="0" rIns="0" bIns="0" rtlCol="0" anchor="t">
             <a:spAutoFit/>
           </a:bodyPr>
           <a:lstStyle/>
@@ -3994,7 +3952,7 @@
 </file>
 
 <file path=ppt/slides/slide11.xml><?xml version="1.0" encoding="utf-8"?>
-<p:sld xmlns:p="http://schemas.openxmlformats.org/presentationml/2006/main" xmlns:a="http://schemas.openxmlformats.org/drawingml/2006/main" xmlns:r="http://schemas.openxmlformats.org/officeDocument/2006/relationships">
+<p:sld xmlns:a="http://schemas.openxmlformats.org/drawingml/2006/main" xmlns:r="http://schemas.openxmlformats.org/officeDocument/2006/relationships" xmlns:p="http://schemas.openxmlformats.org/presentationml/2006/main">
   <p:cSld>
     <p:spTree>
       <p:nvGrpSpPr>
@@ -4012,21 +3970,21 @@
       </p:grpSpPr>
       <p:pic>
         <p:nvPicPr>
-          <p:cNvPr name="Picture 2" id="2"/>
+          <p:cNvPr id="2" name="Picture 2"/>
           <p:cNvPicPr>
-            <a:picLocks noChangeAspect="true"/>
+            <a:picLocks noChangeAspect="1"/>
           </p:cNvPicPr>
           <p:nvPr/>
         </p:nvPicPr>
         <p:blipFill>
           <a:blip r:embed="rId2"/>
-          <a:srcRect l="20430" t="0" r="34460" b="0"/>
+          <a:srcRect l="20430" r="34460"/>
           <a:stretch>
             <a:fillRect/>
           </a:stretch>
         </p:blipFill>
         <p:spPr>
-          <a:xfrm flipH="false" flipV="false" rot="0">
+          <a:xfrm>
             <a:off x="13633649" y="1028700"/>
             <a:ext cx="3625651" cy="8037628"/>
           </a:xfrm>
@@ -4037,21 +3995,21 @@
       </p:pic>
       <p:pic>
         <p:nvPicPr>
-          <p:cNvPr name="Picture 3" id="3"/>
+          <p:cNvPr id="3" name="Picture 3"/>
           <p:cNvPicPr>
-            <a:picLocks noChangeAspect="true"/>
+            <a:picLocks noChangeAspect="1"/>
           </p:cNvPicPr>
           <p:nvPr/>
         </p:nvPicPr>
         <p:blipFill>
           <a:blip r:embed="rId3"/>
-          <a:srcRect l="21966" t="0" r="31978" b="0"/>
+          <a:srcRect l="21966" r="31978"/>
           <a:stretch>
             <a:fillRect/>
           </a:stretch>
         </p:blipFill>
         <p:spPr>
-          <a:xfrm flipH="false" flipV="false" rot="0">
+          <a:xfrm>
             <a:off x="925989" y="1028700"/>
             <a:ext cx="3701713" cy="8037628"/>
           </a:xfrm>
@@ -4062,21 +4020,21 @@
       </p:pic>
       <p:pic>
         <p:nvPicPr>
-          <p:cNvPr name="Picture 4" id="4"/>
+          <p:cNvPr id="4" name="Picture 4"/>
           <p:cNvPicPr>
-            <a:picLocks noChangeAspect="true"/>
+            <a:picLocks noChangeAspect="1"/>
           </p:cNvPicPr>
           <p:nvPr/>
         </p:nvPicPr>
         <p:blipFill>
           <a:blip r:embed="rId4"/>
-          <a:srcRect l="0" t="0" r="0" b="0"/>
+          <a:srcRect/>
           <a:stretch>
             <a:fillRect/>
           </a:stretch>
         </p:blipFill>
         <p:spPr>
-          <a:xfrm flipH="false" flipV="false" rot="0">
+          <a:xfrm>
             <a:off x="1447038" y="1982462"/>
             <a:ext cx="2659617" cy="2659617"/>
           </a:xfrm>
@@ -4087,21 +4045,21 @@
       </p:pic>
       <p:pic>
         <p:nvPicPr>
-          <p:cNvPr name="Picture 5" id="5"/>
+          <p:cNvPr id="5" name="Picture 5"/>
           <p:cNvPicPr>
-            <a:picLocks noChangeAspect="true"/>
+            <a:picLocks noChangeAspect="1"/>
           </p:cNvPicPr>
           <p:nvPr/>
         </p:nvPicPr>
         <p:blipFill>
           <a:blip r:embed="rId4"/>
-          <a:srcRect l="0" t="0" r="0" b="0"/>
+          <a:srcRect/>
           <a:stretch>
             <a:fillRect/>
           </a:stretch>
         </p:blipFill>
         <p:spPr>
-          <a:xfrm flipH="false" flipV="false" rot="0">
+          <a:xfrm>
             <a:off x="14269066" y="1982462"/>
             <a:ext cx="2659617" cy="2659617"/>
           </a:xfrm>
@@ -4112,14 +4070,14 @@
       </p:pic>
       <p:grpSp>
         <p:nvGrpSpPr>
-          <p:cNvPr name="Group 6" id="6"/>
+          <p:cNvPr id="6" name="Group 6"/>
           <p:cNvGrpSpPr>
-            <a:grpSpLocks noChangeAspect="true"/>
+            <a:grpSpLocks noChangeAspect="1"/>
           </p:cNvGrpSpPr>
           <p:nvPr/>
         </p:nvGrpSpPr>
         <p:grpSpPr>
-          <a:xfrm rot="0">
+          <a:xfrm>
             <a:off x="5623717" y="1640325"/>
             <a:ext cx="1453259" cy="1453253"/>
             <a:chOff x="0" y="0"/>
@@ -4128,7 +4086,7 @@
         </p:grpSpPr>
         <p:sp>
           <p:nvSpPr>
-            <p:cNvPr name="Freeform 7" id="7"/>
+            <p:cNvPr id="7" name="Freeform 7"/>
             <p:cNvSpPr/>
             <p:nvPr/>
           </p:nvSpPr>
@@ -4142,9 +4100,9 @@
               <a:gdLst/>
               <a:ahLst/>
               <a:cxnLst/>
-              <a:rect r="r" b="b" t="t" l="l"/>
+              <a:rect l="l" t="t" r="r" b="b"/>
               <a:pathLst>
-                <a:path h="6349974" w="6350000">
+                <a:path w="6350000" h="6349974">
                   <a:moveTo>
                     <a:pt x="6350000" y="3175025"/>
                   </a:moveTo>
@@ -4175,7 +4133,7 @@
             <a:blipFill>
               <a:blip r:embed="rId3"/>
               <a:stretch>
-                <a:fillRect l="-83186" r="-110948" t="-37855" b="-156280"/>
+                <a:fillRect l="-83186" t="-37855" r="-110948" b="-156280"/>
               </a:stretch>
             </a:blipFill>
           </p:spPr>
@@ -4183,14 +4141,14 @@
       </p:grpSp>
       <p:grpSp>
         <p:nvGrpSpPr>
-          <p:cNvPr name="Group 8" id="8"/>
+          <p:cNvPr id="8" name="Group 8"/>
           <p:cNvGrpSpPr>
-            <a:grpSpLocks noChangeAspect="true"/>
+            <a:grpSpLocks noChangeAspect="1"/>
           </p:cNvGrpSpPr>
           <p:nvPr/>
         </p:nvGrpSpPr>
         <p:grpSpPr>
-          <a:xfrm rot="0">
+          <a:xfrm>
             <a:off x="11682854" y="1548775"/>
             <a:ext cx="1453259" cy="1453253"/>
             <a:chOff x="0" y="0"/>
@@ -4199,7 +4157,7 @@
         </p:grpSpPr>
         <p:sp>
           <p:nvSpPr>
-            <p:cNvPr name="Freeform 9" id="9"/>
+            <p:cNvPr id="9" name="Freeform 9"/>
             <p:cNvSpPr/>
             <p:nvPr/>
           </p:nvSpPr>
@@ -4213,9 +4171,9 @@
               <a:gdLst/>
               <a:ahLst/>
               <a:cxnLst/>
-              <a:rect r="r" b="b" t="t" l="l"/>
+              <a:rect l="l" t="t" r="r" b="b"/>
               <a:pathLst>
-                <a:path h="6349974" w="6350000">
+                <a:path w="6350000" h="6349974">
                   <a:moveTo>
                     <a:pt x="6350000" y="3175025"/>
                   </a:moveTo>
@@ -4246,7 +4204,7 @@
             <a:blipFill>
               <a:blip r:embed="rId2"/>
               <a:stretch>
-                <a:fillRect l="-99440" r="-148524" t="-51104" b="-196862"/>
+                <a:fillRect l="-99440" t="-51104" r="-148524" b="-196862"/>
               </a:stretch>
             </a:blipFill>
           </p:spPr>
@@ -4254,12 +4212,12 @@
       </p:grpSp>
       <p:grpSp>
         <p:nvGrpSpPr>
-          <p:cNvPr name="Group 10" id="10"/>
+          <p:cNvPr id="10" name="Group 10"/>
           <p:cNvGrpSpPr/>
           <p:nvPr/>
         </p:nvGrpSpPr>
         <p:grpSpPr>
-          <a:xfrm rot="0">
+          <a:xfrm>
             <a:off x="11012591" y="6680490"/>
             <a:ext cx="2464202" cy="329109"/>
             <a:chOff x="0" y="0"/>
@@ -4268,7 +4226,7 @@
         </p:grpSpPr>
         <p:sp>
           <p:nvSpPr>
-            <p:cNvPr name="Freeform 11" id="11"/>
+            <p:cNvPr id="11" name="Freeform 11"/>
             <p:cNvSpPr/>
             <p:nvPr/>
           </p:nvSpPr>
@@ -4282,9 +4240,9 @@
               <a:gdLst/>
               <a:ahLst/>
               <a:cxnLst/>
-              <a:rect r="r" b="b" t="t" l="l"/>
+              <a:rect l="l" t="t" r="r" b="b"/>
               <a:pathLst>
-                <a:path h="76200" w="3507740">
+                <a:path w="3507740" h="76200">
                   <a:moveTo>
                     <a:pt x="0" y="0"/>
                   </a:moveTo>
@@ -4308,7 +4266,7 @@
         </p:sp>
         <p:sp>
           <p:nvSpPr>
-            <p:cNvPr name="Freeform 12" id="12"/>
+            <p:cNvPr id="12" name="Freeform 12"/>
             <p:cNvSpPr/>
             <p:nvPr/>
           </p:nvSpPr>
@@ -4322,9 +4280,9 @@
               <a:gdLst/>
               <a:ahLst/>
               <a:cxnLst/>
-              <a:rect r="r" b="b" t="t" l="l"/>
+              <a:rect l="l" t="t" r="r" b="b"/>
               <a:pathLst>
-                <a:path h="505460" w="374650">
+                <a:path w="374650" h="505460">
                   <a:moveTo>
                     <a:pt x="0" y="505460"/>
                   </a:moveTo>
@@ -4346,12 +4304,12 @@
       </p:grpSp>
       <p:sp>
         <p:nvSpPr>
-          <p:cNvPr name="TextBox 13" id="13"/>
-          <p:cNvSpPr txBox="true"/>
+          <p:cNvPr id="13" name="TextBox 13"/>
+          <p:cNvSpPr txBox="1"/>
           <p:nvPr/>
         </p:nvSpPr>
         <p:spPr>
-          <a:xfrm rot="0">
+          <a:xfrm>
             <a:off x="7322939" y="3682017"/>
             <a:ext cx="3642122" cy="1815350"/>
           </a:xfrm>
@@ -4360,7 +4318,7 @@
           </a:prstGeom>
         </p:spPr>
         <p:txBody>
-          <a:bodyPr anchor="t" rtlCol="false" tIns="0" lIns="0" bIns="0" rIns="0">
+          <a:bodyPr lIns="0" tIns="0" rIns="0" bIns="0" rtlCol="0" anchor="t">
             <a:spAutoFit/>
           </a:bodyPr>
           <a:lstStyle/>
@@ -4400,7 +4358,7 @@
       </p:sp>
       <p:grpSp>
         <p:nvGrpSpPr>
-          <p:cNvPr name="Group 14" id="14"/>
+          <p:cNvPr id="14" name="Group 14"/>
           <p:cNvGrpSpPr/>
           <p:nvPr/>
         </p:nvGrpSpPr>
@@ -4414,7 +4372,7 @@
         </p:grpSpPr>
         <p:sp>
           <p:nvSpPr>
-            <p:cNvPr name="Freeform 15" id="15"/>
+            <p:cNvPr id="15" name="Freeform 15"/>
             <p:cNvSpPr/>
             <p:nvPr/>
           </p:nvSpPr>
@@ -4428,9 +4386,9 @@
               <a:gdLst/>
               <a:ahLst/>
               <a:cxnLst/>
-              <a:rect r="r" b="b" t="t" l="l"/>
+              <a:rect l="l" t="t" r="r" b="b"/>
               <a:pathLst>
-                <a:path h="203200" w="8331200">
+                <a:path w="8331200" h="203200">
                   <a:moveTo>
                     <a:pt x="101600" y="0"/>
                   </a:moveTo>
@@ -4946,12 +4904,12 @@
       </p:grpSp>
       <p:sp>
         <p:nvSpPr>
-          <p:cNvPr name="TextBox 16" id="16"/>
-          <p:cNvSpPr txBox="true"/>
+          <p:cNvPr id="16" name="TextBox 16"/>
+          <p:cNvSpPr txBox="1"/>
           <p:nvPr/>
         </p:nvSpPr>
         <p:spPr>
-          <a:xfrm rot="0">
+          <a:xfrm>
             <a:off x="7386827" y="6301444"/>
             <a:ext cx="3506201" cy="1466646"/>
           </a:xfrm>
@@ -4960,7 +4918,7 @@
           </a:prstGeom>
         </p:spPr>
         <p:txBody>
-          <a:bodyPr anchor="t" rtlCol="false" tIns="0" lIns="0" bIns="0" rIns="0">
+          <a:bodyPr lIns="0" tIns="0" rIns="0" bIns="0" rtlCol="0" anchor="t">
             <a:spAutoFit/>
           </a:bodyPr>
           <a:lstStyle/>
@@ -5016,7 +4974,7 @@
       </p:sp>
       <p:grpSp>
         <p:nvGrpSpPr>
-          <p:cNvPr name="Group 17" id="17"/>
+          <p:cNvPr id="17" name="Group 17"/>
           <p:cNvGrpSpPr/>
           <p:nvPr/>
         </p:nvGrpSpPr>
@@ -5030,7 +4988,7 @@
         </p:grpSpPr>
         <p:sp>
           <p:nvSpPr>
-            <p:cNvPr name="Freeform 18" id="18"/>
+            <p:cNvPr id="18" name="Freeform 18"/>
             <p:cNvSpPr/>
             <p:nvPr/>
           </p:nvSpPr>
@@ -5044,9 +5002,9 @@
               <a:gdLst/>
               <a:ahLst/>
               <a:cxnLst/>
-              <a:rect r="r" b="b" t="t" l="l"/>
+              <a:rect l="l" t="t" r="r" b="b"/>
               <a:pathLst>
-                <a:path h="203200" w="8331200">
+                <a:path w="8331200" h="203200">
                   <a:moveTo>
                     <a:pt x="101600" y="0"/>
                   </a:moveTo>
@@ -5562,7 +5520,7 @@
       </p:grpSp>
       <p:grpSp>
         <p:nvGrpSpPr>
-          <p:cNvPr name="Group 19" id="19"/>
+          <p:cNvPr id="19" name="Group 19"/>
           <p:cNvGrpSpPr/>
           <p:nvPr/>
         </p:nvGrpSpPr>
@@ -5576,7 +5534,7 @@
         </p:grpSpPr>
         <p:sp>
           <p:nvSpPr>
-            <p:cNvPr name="Freeform 20" id="20"/>
+            <p:cNvPr id="20" name="Freeform 20"/>
             <p:cNvSpPr/>
             <p:nvPr/>
           </p:nvSpPr>
@@ -5590,9 +5548,9 @@
               <a:gdLst/>
               <a:ahLst/>
               <a:cxnLst/>
-              <a:rect r="r" b="b" t="t" l="l"/>
+              <a:rect l="l" t="t" r="r" b="b"/>
               <a:pathLst>
-                <a:path h="203200" w="8331200">
+                <a:path w="8331200" h="203200">
                   <a:moveTo>
                     <a:pt x="101600" y="0"/>
                   </a:moveTo>
@@ -6108,7 +6066,7 @@
       </p:grpSp>
       <p:grpSp>
         <p:nvGrpSpPr>
-          <p:cNvPr name="Group 21" id="21"/>
+          <p:cNvPr id="21" name="Group 21"/>
           <p:cNvGrpSpPr/>
           <p:nvPr/>
         </p:nvGrpSpPr>
@@ -6122,7 +6080,7 @@
         </p:grpSpPr>
         <p:sp>
           <p:nvSpPr>
-            <p:cNvPr name="Freeform 22" id="22"/>
+            <p:cNvPr id="22" name="Freeform 22"/>
             <p:cNvSpPr/>
             <p:nvPr/>
           </p:nvSpPr>
@@ -6136,9 +6094,9 @@
               <a:gdLst/>
               <a:ahLst/>
               <a:cxnLst/>
-              <a:rect r="r" b="b" t="t" l="l"/>
+              <a:rect l="l" t="t" r="r" b="b"/>
               <a:pathLst>
-                <a:path h="203200" w="8331200">
+                <a:path w="8331200" h="203200">
                   <a:moveTo>
                     <a:pt x="101600" y="0"/>
                   </a:moveTo>
@@ -6654,12 +6612,12 @@
       </p:grpSp>
       <p:grpSp>
         <p:nvGrpSpPr>
-          <p:cNvPr name="Group 23" id="23"/>
+          <p:cNvPr id="23" name="Group 23"/>
           <p:cNvGrpSpPr/>
           <p:nvPr/>
         </p:nvGrpSpPr>
         <p:grpSpPr>
-          <a:xfrm rot="0">
+          <a:xfrm>
             <a:off x="4722953" y="6680490"/>
             <a:ext cx="2464202" cy="329109"/>
             <a:chOff x="0" y="0"/>
@@ -6668,7 +6626,7 @@
         </p:grpSpPr>
         <p:sp>
           <p:nvSpPr>
-            <p:cNvPr name="Freeform 24" id="24"/>
+            <p:cNvPr id="24" name="Freeform 24"/>
             <p:cNvSpPr/>
             <p:nvPr/>
           </p:nvSpPr>
@@ -6682,9 +6640,9 @@
               <a:gdLst/>
               <a:ahLst/>
               <a:cxnLst/>
-              <a:rect r="r" b="b" t="t" l="l"/>
+              <a:rect l="l" t="t" r="r" b="b"/>
               <a:pathLst>
-                <a:path h="76200" w="3507740">
+                <a:path w="3507740" h="76200">
                   <a:moveTo>
                     <a:pt x="0" y="0"/>
                   </a:moveTo>
@@ -6708,7 +6666,7 @@
         </p:sp>
         <p:sp>
           <p:nvSpPr>
-            <p:cNvPr name="Freeform 25" id="25"/>
+            <p:cNvPr id="25" name="Freeform 25"/>
             <p:cNvSpPr/>
             <p:nvPr/>
           </p:nvSpPr>
@@ -6722,9 +6680,9 @@
               <a:gdLst/>
               <a:ahLst/>
               <a:cxnLst/>
-              <a:rect r="r" b="b" t="t" l="l"/>
+              <a:rect l="l" t="t" r="r" b="b"/>
               <a:pathLst>
-                <a:path h="505460" w="374650">
+                <a:path w="374650" h="505460">
                   <a:moveTo>
                     <a:pt x="0" y="505460"/>
                   </a:moveTo>
@@ -6753,7 +6711,7 @@
 </file>
 
 <file path=ppt/slides/slide12.xml><?xml version="1.0" encoding="utf-8"?>
-<p:sld xmlns:p="http://schemas.openxmlformats.org/presentationml/2006/main" xmlns:a="http://schemas.openxmlformats.org/drawingml/2006/main">
+<p:sld xmlns:a="http://schemas.openxmlformats.org/drawingml/2006/main" xmlns:r="http://schemas.openxmlformats.org/officeDocument/2006/relationships" xmlns:p="http://schemas.openxmlformats.org/presentationml/2006/main">
   <p:cSld>
     <p:spTree>
       <p:nvGrpSpPr>
@@ -6771,12 +6729,12 @@
       </p:grpSpPr>
       <p:grpSp>
         <p:nvGrpSpPr>
-          <p:cNvPr name="Group 2" id="2"/>
+          <p:cNvPr id="2" name="Group 2"/>
           <p:cNvGrpSpPr/>
           <p:nvPr/>
         </p:nvGrpSpPr>
         <p:grpSpPr>
-          <a:xfrm rot="0">
+          <a:xfrm>
             <a:off x="-399792" y="-203994"/>
             <a:ext cx="19427467" cy="2097967"/>
             <a:chOff x="0" y="0"/>
@@ -6785,7 +6743,7 @@
         </p:grpSpPr>
         <p:sp>
           <p:nvSpPr>
-            <p:cNvPr name="Freeform 3" id="3"/>
+            <p:cNvPr id="3" name="Freeform 3"/>
             <p:cNvSpPr/>
             <p:nvPr/>
           </p:nvSpPr>
@@ -6799,9 +6757,9 @@
               <a:gdLst/>
               <a:ahLst/>
               <a:cxnLst/>
-              <a:rect r="r" b="b" t="t" l="l"/>
+              <a:rect l="l" t="t" r="r" b="b"/>
               <a:pathLst>
-                <a:path h="607918" w="5629406">
+                <a:path w="5629406" h="607918">
                   <a:moveTo>
                     <a:pt x="0" y="0"/>
                   </a:moveTo>
@@ -6826,12 +6784,12 @@
       </p:grpSp>
       <p:sp>
         <p:nvSpPr>
-          <p:cNvPr name="TextBox 4" id="4"/>
-          <p:cNvSpPr txBox="true"/>
+          <p:cNvPr id="4" name="TextBox 4"/>
+          <p:cNvSpPr txBox="1"/>
           <p:nvPr/>
         </p:nvSpPr>
         <p:spPr>
-          <a:xfrm rot="0">
+          <a:xfrm>
             <a:off x="742950" y="2770135"/>
             <a:ext cx="16802100" cy="7591178"/>
           </a:xfrm>
@@ -6840,12 +6798,12 @@
           </a:prstGeom>
         </p:spPr>
         <p:txBody>
-          <a:bodyPr anchor="t" rtlCol="false" tIns="0" lIns="0" bIns="0" rIns="0">
+          <a:bodyPr lIns="0" tIns="0" rIns="0" bIns="0" rtlCol="0" anchor="t">
             <a:spAutoFit/>
           </a:bodyPr>
           <a:lstStyle/>
           <a:p>
-            <a:pPr algn="l" marL="0" indent="0" lvl="0">
+            <a:pPr marL="0" lvl="0" indent="0" algn="l">
               <a:lnSpc>
                 <a:spcPts val="6299"/>
               </a:lnSpc>
@@ -6860,7 +6818,16 @@
                 </a:solidFill>
                 <a:latin typeface="Open Sans Bold"/>
               </a:rPr>
-              <a:t>Similarity I</a:t>
+              <a:t>Similarity In</a:t>
+            </a:r>
+            <a:r>
+              <a:rPr lang="en-US" sz="4500" u="none">
+                <a:solidFill>
+                  <a:srgbClr val="000000"/>
+                </a:solidFill>
+                <a:latin typeface="Open Sans Bold"/>
+              </a:rPr>
+              <a:t>d</a:t>
             </a:r>
             <a:r>
               <a:rPr lang="en-US" sz="4500">
@@ -6869,7 +6836,7 @@
                 </a:solidFill>
                 <a:latin typeface="Open Sans Bold"/>
               </a:rPr>
-              <a:t>n</a:t>
+              <a:t>ex -</a:t>
             </a:r>
             <a:r>
               <a:rPr lang="en-US" sz="4500" u="none">
@@ -6878,29 +6845,11 @@
                 </a:solidFill>
                 <a:latin typeface="Open Sans Bold"/>
               </a:rPr>
-              <a:t>d</a:t>
-            </a:r>
-            <a:r>
-              <a:rPr lang="en-US" sz="4500">
-                <a:solidFill>
-                  <a:srgbClr val="000000"/>
-                </a:solidFill>
-                <a:latin typeface="Open Sans Bold"/>
-              </a:rPr>
-              <a:t>ex -</a:t>
-            </a:r>
-            <a:r>
-              <a:rPr lang="en-US" sz="4500" u="none">
-                <a:solidFill>
-                  <a:srgbClr val="000000"/>
-                </a:solidFill>
-                <a:latin typeface="Open Sans Bold"/>
-              </a:rPr>
               <a:t> SSIM values :</a:t>
             </a:r>
           </a:p>
           <a:p>
-            <a:pPr algn="l" marL="0" indent="0" lvl="0">
+            <a:pPr marL="0" lvl="0" indent="0" algn="l">
               <a:lnSpc>
                 <a:spcPts val="4900"/>
               </a:lnSpc>
@@ -6908,9 +6857,15 @@
                 <a:spcPct val="0"/>
               </a:spcBef>
             </a:pPr>
-          </a:p>
-          <a:p>
-            <a:pPr algn="l" marL="0" indent="0" lvl="0">
+            <a:endParaRPr lang="en-US" sz="4500" u="none">
+              <a:solidFill>
+                <a:srgbClr val="000000"/>
+              </a:solidFill>
+              <a:latin typeface="Open Sans Bold"/>
+            </a:endParaRPr>
+          </a:p>
+          <a:p>
+            <a:pPr marL="0" lvl="0" indent="0" algn="l">
               <a:lnSpc>
                 <a:spcPts val="4900"/>
               </a:lnSpc>
@@ -6974,7 +6929,7 @@
             </a:r>
           </a:p>
           <a:p>
-            <a:pPr algn="l" marL="0" indent="0" lvl="0">
+            <a:pPr marL="0" lvl="0" indent="0" algn="l">
               <a:lnSpc>
                 <a:spcPts val="4900"/>
               </a:lnSpc>
@@ -7236,7 +7191,7 @@
             </a:r>
           </a:p>
           <a:p>
-            <a:pPr algn="l" marL="0" indent="0" lvl="0">
+            <a:pPr marL="0" lvl="0" indent="0" algn="l">
               <a:lnSpc>
                 <a:spcPts val="4900"/>
               </a:lnSpc>
@@ -7534,7 +7489,7 @@
             </a:r>
           </a:p>
           <a:p>
-            <a:pPr algn="l" marL="0" indent="0" lvl="0">
+            <a:pPr marL="0" lvl="0" indent="0" algn="l">
               <a:lnSpc>
                 <a:spcPts val="4900"/>
               </a:lnSpc>
@@ -7634,7 +7589,7 @@
             </a:r>
           </a:p>
           <a:p>
-            <a:pPr algn="l" marL="0" indent="0" lvl="0">
+            <a:pPr marL="0" lvl="0" indent="0" algn="l">
               <a:lnSpc>
                 <a:spcPts val="4900"/>
               </a:lnSpc>
@@ -7752,7 +7707,7 @@
             </a:r>
           </a:p>
           <a:p>
-            <a:pPr algn="l" marL="0" indent="0" lvl="0">
+            <a:pPr marL="0" lvl="0" indent="0" algn="l">
               <a:lnSpc>
                 <a:spcPts val="4900"/>
               </a:lnSpc>
@@ -7760,9 +7715,15 @@
                 <a:spcPct val="0"/>
               </a:spcBef>
             </a:pPr>
-          </a:p>
-          <a:p>
-            <a:pPr algn="l" marL="0" indent="0" lvl="0">
+            <a:endParaRPr lang="en-US" sz="3500" u="none">
+              <a:solidFill>
+                <a:srgbClr val="000000"/>
+              </a:solidFill>
+              <a:latin typeface="Open Sans Bold"/>
+            </a:endParaRPr>
+          </a:p>
+          <a:p>
+            <a:pPr marL="0" lvl="0" indent="0" algn="l">
               <a:lnSpc>
                 <a:spcPts val="4900"/>
               </a:lnSpc>
@@ -7770,9 +7731,15 @@
                 <a:spcPct val="0"/>
               </a:spcBef>
             </a:pPr>
-          </a:p>
-          <a:p>
-            <a:pPr algn="l" marL="0" indent="0" lvl="0">
+            <a:endParaRPr lang="en-US" sz="3500" u="none">
+              <a:solidFill>
+                <a:srgbClr val="000000"/>
+              </a:solidFill>
+              <a:latin typeface="Open Sans Bold"/>
+            </a:endParaRPr>
+          </a:p>
+          <a:p>
+            <a:pPr marL="0" lvl="0" indent="0" algn="l">
               <a:lnSpc>
                 <a:spcPts val="4900"/>
               </a:lnSpc>
@@ -7780,17 +7747,23 @@
                 <a:spcPct val="0"/>
               </a:spcBef>
             </a:pPr>
+            <a:endParaRPr lang="en-US" sz="3500" u="none">
+              <a:solidFill>
+                <a:srgbClr val="000000"/>
+              </a:solidFill>
+              <a:latin typeface="Open Sans Bold"/>
+            </a:endParaRPr>
           </a:p>
         </p:txBody>
       </p:sp>
       <p:sp>
         <p:nvSpPr>
-          <p:cNvPr name="TextBox 5" id="5"/>
-          <p:cNvSpPr txBox="true"/>
+          <p:cNvPr id="5" name="TextBox 5"/>
+          <p:cNvSpPr txBox="1"/>
           <p:nvPr/>
         </p:nvSpPr>
         <p:spPr>
-          <a:xfrm rot="0">
+          <a:xfrm>
             <a:off x="1028700" y="190500"/>
             <a:ext cx="3875336" cy="1368425"/>
           </a:xfrm>
@@ -7799,7 +7772,7 @@
           </a:prstGeom>
         </p:spPr>
         <p:txBody>
-          <a:bodyPr anchor="t" rtlCol="false" tIns="0" lIns="0" bIns="0" rIns="0">
+          <a:bodyPr lIns="0" tIns="0" rIns="0" bIns="0" rtlCol="0" anchor="t">
             <a:spAutoFit/>
           </a:bodyPr>
           <a:lstStyle/>
@@ -7830,7 +7803,7 @@
 </file>
 
 <file path=ppt/slides/slide13.xml><?xml version="1.0" encoding="utf-8"?>
-<p:sld xmlns:p="http://schemas.openxmlformats.org/presentationml/2006/main" xmlns:a="http://schemas.openxmlformats.org/drawingml/2006/main">
+<p:sld xmlns:a="http://schemas.openxmlformats.org/drawingml/2006/main" xmlns:r="http://schemas.openxmlformats.org/officeDocument/2006/relationships" xmlns:p="http://schemas.openxmlformats.org/presentationml/2006/main">
   <p:cSld>
     <p:spTree>
       <p:nvGrpSpPr>
@@ -7848,12 +7821,12 @@
       </p:grpSpPr>
       <p:grpSp>
         <p:nvGrpSpPr>
-          <p:cNvPr name="Group 2" id="2"/>
+          <p:cNvPr id="2" name="Group 2"/>
           <p:cNvGrpSpPr/>
           <p:nvPr/>
         </p:nvGrpSpPr>
         <p:grpSpPr>
-          <a:xfrm rot="0">
+          <a:xfrm>
             <a:off x="-399792" y="-203994"/>
             <a:ext cx="19427467" cy="2097967"/>
             <a:chOff x="0" y="0"/>
@@ -7862,7 +7835,7 @@
         </p:grpSpPr>
         <p:sp>
           <p:nvSpPr>
-            <p:cNvPr name="Freeform 3" id="3"/>
+            <p:cNvPr id="3" name="Freeform 3"/>
             <p:cNvSpPr/>
             <p:nvPr/>
           </p:nvSpPr>
@@ -7876,9 +7849,9 @@
               <a:gdLst/>
               <a:ahLst/>
               <a:cxnLst/>
-              <a:rect r="r" b="b" t="t" l="l"/>
+              <a:rect l="l" t="t" r="r" b="b"/>
               <a:pathLst>
-                <a:path h="607918" w="5629406">
+                <a:path w="5629406" h="607918">
                   <a:moveTo>
                     <a:pt x="0" y="0"/>
                   </a:moveTo>
@@ -7903,12 +7876,12 @@
       </p:grpSp>
       <p:sp>
         <p:nvSpPr>
-          <p:cNvPr name="TextBox 4" id="4"/>
-          <p:cNvSpPr txBox="true"/>
+          <p:cNvPr id="4" name="TextBox 4"/>
+          <p:cNvSpPr txBox="1"/>
           <p:nvPr/>
         </p:nvSpPr>
         <p:spPr>
-          <a:xfrm rot="0">
+          <a:xfrm>
             <a:off x="742950" y="2798710"/>
             <a:ext cx="16802100" cy="5544429"/>
           </a:xfrm>
@@ -7917,7 +7890,7 @@
           </a:prstGeom>
         </p:spPr>
         <p:txBody>
-          <a:bodyPr anchor="t" rtlCol="false" tIns="0" lIns="0" bIns="0" rIns="0">
+          <a:bodyPr lIns="0" tIns="0" rIns="0" bIns="0" rtlCol="0" anchor="t">
             <a:spAutoFit/>
           </a:bodyPr>
           <a:lstStyle/>
@@ -7927,6 +7900,7 @@
                 <a:spcPts val="6299"/>
               </a:lnSpc>
             </a:pPr>
+            <a:endParaRPr/>
           </a:p>
           <a:p>
             <a:pPr>
@@ -8047,7 +8021,7 @@
             </a:r>
           </a:p>
           <a:p>
-            <a:pPr algn="l" marL="0" indent="0" lvl="0">
+            <a:pPr marL="0" lvl="0" indent="0" algn="l">
               <a:lnSpc>
                 <a:spcPts val="6299"/>
               </a:lnSpc>
@@ -8055,17 +8029,23 @@
                 <a:spcPct val="0"/>
               </a:spcBef>
             </a:pPr>
+            <a:endParaRPr lang="en-US" sz="2050">
+              <a:solidFill>
+                <a:srgbClr val="000000"/>
+              </a:solidFill>
+              <a:latin typeface="Arimo"/>
+            </a:endParaRPr>
           </a:p>
         </p:txBody>
       </p:sp>
       <p:sp>
         <p:nvSpPr>
-          <p:cNvPr name="TextBox 5" id="5"/>
-          <p:cNvSpPr txBox="true"/>
+          <p:cNvPr id="5" name="TextBox 5"/>
+          <p:cNvSpPr txBox="1"/>
           <p:nvPr/>
         </p:nvSpPr>
         <p:spPr>
-          <a:xfrm rot="0">
+          <a:xfrm>
             <a:off x="1028700" y="190500"/>
             <a:ext cx="4757291" cy="1368425"/>
           </a:xfrm>
@@ -8074,7 +8054,7 @@
           </a:prstGeom>
         </p:spPr>
         <p:txBody>
-          <a:bodyPr anchor="t" rtlCol="false" tIns="0" lIns="0" bIns="0" rIns="0">
+          <a:bodyPr lIns="0" tIns="0" rIns="0" bIns="0" rtlCol="0" anchor="t">
             <a:spAutoFit/>
           </a:bodyPr>
           <a:lstStyle/>
@@ -8105,7 +8085,7 @@
 </file>
 
 <file path=ppt/slides/slide14.xml><?xml version="1.0" encoding="utf-8"?>
-<p:sld xmlns:p="http://schemas.openxmlformats.org/presentationml/2006/main" xmlns:a="http://schemas.openxmlformats.org/drawingml/2006/main">
+<p:sld xmlns:a="http://schemas.openxmlformats.org/drawingml/2006/main" xmlns:r="http://schemas.openxmlformats.org/officeDocument/2006/relationships" xmlns:p="http://schemas.openxmlformats.org/presentationml/2006/main">
   <p:cSld>
     <p:spTree>
       <p:nvGrpSpPr>
@@ -8123,12 +8103,12 @@
       </p:grpSpPr>
       <p:grpSp>
         <p:nvGrpSpPr>
-          <p:cNvPr name="Group 2" id="2"/>
+          <p:cNvPr id="2" name="Group 2"/>
           <p:cNvGrpSpPr/>
           <p:nvPr/>
         </p:nvGrpSpPr>
         <p:grpSpPr>
-          <a:xfrm rot="0">
+          <a:xfrm>
             <a:off x="-569733" y="-466784"/>
             <a:ext cx="19427467" cy="10490994"/>
             <a:chOff x="0" y="0"/>
@@ -8137,7 +8117,7 @@
         </p:grpSpPr>
         <p:sp>
           <p:nvSpPr>
-            <p:cNvPr name="Freeform 3" id="3"/>
+            <p:cNvPr id="3" name="Freeform 3"/>
             <p:cNvSpPr/>
             <p:nvPr/>
           </p:nvSpPr>
@@ -8151,9 +8131,9 @@
               <a:gdLst/>
               <a:ahLst/>
               <a:cxnLst/>
-              <a:rect r="r" b="b" t="t" l="l"/>
+              <a:rect l="l" t="t" r="r" b="b"/>
               <a:pathLst>
-                <a:path h="3039926" w="5629406">
+                <a:path w="5629406" h="3039926">
                   <a:moveTo>
                     <a:pt x="0" y="0"/>
                   </a:moveTo>
@@ -8178,21 +8158,21 @@
       </p:grpSp>
       <p:sp>
         <p:nvSpPr>
-          <p:cNvPr name="TextBox 4" id="4"/>
-          <p:cNvSpPr txBox="true"/>
+          <p:cNvPr id="4" name="TextBox 4"/>
+          <p:cNvSpPr txBox="1"/>
           <p:nvPr/>
         </p:nvSpPr>
         <p:spPr>
-          <a:xfrm rot="0">
-            <a:off x="4300630" y="3952140"/>
-            <a:ext cx="9686740" cy="2144596"/>
+          <a:xfrm>
+            <a:off x="3598115" y="3543300"/>
+            <a:ext cx="11091770" cy="2144596"/>
           </a:xfrm>
           <a:prstGeom prst="rect">
             <a:avLst/>
           </a:prstGeom>
         </p:spPr>
         <p:txBody>
-          <a:bodyPr anchor="t" rtlCol="false" tIns="0" lIns="0" bIns="0" rIns="0">
+          <a:bodyPr wrap="square" lIns="0" tIns="0" rIns="0" bIns="0" rtlCol="0" anchor="t">
             <a:spAutoFit/>
           </a:bodyPr>
           <a:lstStyle/>
@@ -8203,7 +8183,7 @@
               </a:lnSpc>
             </a:pPr>
             <a:r>
-              <a:rPr lang="en-US" sz="12542">
+              <a:rPr lang="en-US" sz="12542" dirty="0">
                 <a:solidFill>
                   <a:srgbClr val="FFFFFF"/>
                 </a:solidFill>
@@ -8223,7 +8203,7 @@
 </file>
 
 <file path=ppt/slides/slide2.xml><?xml version="1.0" encoding="utf-8"?>
-<p:sld xmlns:p="http://schemas.openxmlformats.org/presentationml/2006/main" xmlns:a="http://schemas.openxmlformats.org/drawingml/2006/main">
+<p:sld xmlns:a="http://schemas.openxmlformats.org/drawingml/2006/main" xmlns:r="http://schemas.openxmlformats.org/officeDocument/2006/relationships" xmlns:p="http://schemas.openxmlformats.org/presentationml/2006/main">
   <p:cSld>
     <p:spTree>
       <p:nvGrpSpPr>
@@ -8241,12 +8221,12 @@
       </p:grpSpPr>
       <p:grpSp>
         <p:nvGrpSpPr>
-          <p:cNvPr name="Group 2" id="2"/>
+          <p:cNvPr id="2" name="Group 2"/>
           <p:cNvGrpSpPr/>
           <p:nvPr/>
         </p:nvGrpSpPr>
         <p:grpSpPr>
-          <a:xfrm rot="0">
+          <a:xfrm>
             <a:off x="-399792" y="-203994"/>
             <a:ext cx="19427467" cy="3079306"/>
             <a:chOff x="0" y="0"/>
@@ -8255,7 +8235,7 @@
         </p:grpSpPr>
         <p:sp>
           <p:nvSpPr>
-            <p:cNvPr name="Freeform 3" id="3"/>
+            <p:cNvPr id="3" name="Freeform 3"/>
             <p:cNvSpPr/>
             <p:nvPr/>
           </p:nvSpPr>
@@ -8269,9 +8249,9 @@
               <a:gdLst/>
               <a:ahLst/>
               <a:cxnLst/>
-              <a:rect r="r" b="b" t="t" l="l"/>
+              <a:rect l="l" t="t" r="r" b="b"/>
               <a:pathLst>
-                <a:path h="892276" w="5629406">
+                <a:path w="5629406" h="892276">
                   <a:moveTo>
                     <a:pt x="0" y="0"/>
                   </a:moveTo>
@@ -8296,12 +8276,12 @@
       </p:grpSp>
       <p:sp>
         <p:nvSpPr>
-          <p:cNvPr name="TextBox 4" id="4"/>
-          <p:cNvSpPr txBox="true"/>
+          <p:cNvPr id="4" name="TextBox 4"/>
+          <p:cNvSpPr txBox="1"/>
           <p:nvPr/>
         </p:nvSpPr>
         <p:spPr>
-          <a:xfrm rot="0">
+          <a:xfrm>
             <a:off x="1028700" y="200025"/>
             <a:ext cx="15826153" cy="2441575"/>
           </a:xfrm>
@@ -8310,7 +8290,7 @@
           </a:prstGeom>
         </p:spPr>
         <p:txBody>
-          <a:bodyPr anchor="t" rtlCol="false" tIns="0" lIns="0" bIns="0" rIns="0">
+          <a:bodyPr lIns="0" tIns="0" rIns="0" bIns="0" rtlCol="0" anchor="t">
             <a:spAutoFit/>
           </a:bodyPr>
           <a:lstStyle/>
@@ -8334,12 +8314,12 @@
       </p:sp>
       <p:sp>
         <p:nvSpPr>
-          <p:cNvPr name="TextBox 5" id="5"/>
-          <p:cNvSpPr txBox="true"/>
+          <p:cNvPr id="5" name="TextBox 5"/>
+          <p:cNvSpPr txBox="1"/>
           <p:nvPr/>
         </p:nvSpPr>
         <p:spPr>
-          <a:xfrm rot="0">
+          <a:xfrm>
             <a:off x="1327109" y="2989868"/>
             <a:ext cx="15527744" cy="7191375"/>
           </a:xfrm>
@@ -8348,7 +8328,7 @@
           </a:prstGeom>
         </p:spPr>
         <p:txBody>
-          <a:bodyPr anchor="t" rtlCol="false" tIns="0" lIns="0" bIns="0" rIns="0">
+          <a:bodyPr lIns="0" tIns="0" rIns="0" bIns="0" rtlCol="0" anchor="t">
             <a:spAutoFit/>
           </a:bodyPr>
           <a:lstStyle/>
@@ -8374,25 +8354,7 @@
                 </a:solidFill>
                 <a:latin typeface="Open Sans"/>
               </a:rPr>
-              <a:t> :In</a:t>
-            </a:r>
-            <a:r>
-              <a:rPr lang="en-US" sz="4500">
-                <a:solidFill>
-                  <a:srgbClr val="000000"/>
-                </a:solidFill>
-                <a:latin typeface="Open Sans"/>
-              </a:rPr>
-              <a:t>d</a:t>
-            </a:r>
-            <a:r>
-              <a:rPr lang="en-US" sz="4500">
-                <a:solidFill>
-                  <a:srgbClr val="000000"/>
-                </a:solidFill>
-                <a:latin typeface="Open Sans"/>
-              </a:rPr>
-              <a:t>ian Space Research Organization (ISRO)</a:t>
+              <a:t> :Indian Space Research Organization (ISRO)</a:t>
             </a:r>
           </a:p>
           <a:p>
@@ -8417,79 +8379,7 @@
                 </a:solidFill>
                 <a:latin typeface="Open Sans"/>
               </a:rPr>
-              <a:t>:  Reconstruction of missing </a:t>
-            </a:r>
-            <a:r>
-              <a:rPr lang="en-US" sz="4500">
-                <a:solidFill>
-                  <a:srgbClr val="000000"/>
-                </a:solidFill>
-                <a:latin typeface="Open Sans"/>
-              </a:rPr>
-              <a:t>d</a:t>
-            </a:r>
-            <a:r>
-              <a:rPr lang="en-US" sz="4500">
-                <a:solidFill>
-                  <a:srgbClr val="000000"/>
-                </a:solidFill>
-                <a:latin typeface="Open Sans"/>
-              </a:rPr>
-              <a:t>ata</a:t>
-            </a:r>
-            <a:r>
-              <a:rPr lang="en-US" sz="4500">
-                <a:solidFill>
-                  <a:srgbClr val="000000"/>
-                </a:solidFill>
-                <a:latin typeface="Open Sans"/>
-              </a:rPr>
-              <a:t> </a:t>
-            </a:r>
-            <a:r>
-              <a:rPr lang="en-US" sz="4500">
-                <a:solidFill>
-                  <a:srgbClr val="000000"/>
-                </a:solidFill>
-                <a:latin typeface="Open Sans"/>
-              </a:rPr>
-              <a:t>in S</a:t>
-            </a:r>
-            <a:r>
-              <a:rPr lang="en-US" sz="4500">
-                <a:solidFill>
-                  <a:srgbClr val="000000"/>
-                </a:solidFill>
-                <a:latin typeface="Open Sans"/>
-              </a:rPr>
-              <a:t>a</a:t>
-            </a:r>
-            <a:r>
-              <a:rPr lang="en-US" sz="4500">
-                <a:solidFill>
-                  <a:srgbClr val="000000"/>
-                </a:solidFill>
-                <a:latin typeface="Open Sans"/>
-              </a:rPr>
-              <a:t>tellite</a:t>
-            </a:r>
-            <a:r>
-              <a:rPr lang="en-US" sz="4500">
-                <a:solidFill>
-                  <a:srgbClr val="000000"/>
-                </a:solidFill>
-                <a:latin typeface="Open Sans"/>
-              </a:rPr>
-              <a:t> </a:t>
-            </a:r>
-            <a:r>
-              <a:rPr lang="en-US" sz="4500">
-                <a:solidFill>
-                  <a:srgbClr val="000000"/>
-                </a:solidFill>
-                <a:latin typeface="Open Sans"/>
-              </a:rPr>
-              <a:t>Imagery</a:t>
+              <a:t>:  Reconstruction of missing data in Satellite Imagery</a:t>
             </a:r>
           </a:p>
           <a:p>
@@ -8505,43 +8395,7 @@
                 </a:solidFill>
                 <a:latin typeface="Open Sans Bold"/>
               </a:rPr>
-              <a:t>PS N</a:t>
-            </a:r>
-            <a:r>
-              <a:rPr lang="en-US" sz="4500">
-                <a:solidFill>
-                  <a:srgbClr val="000000"/>
-                </a:solidFill>
-                <a:latin typeface="Open Sans Bold"/>
-              </a:rPr>
-              <a:t>u</a:t>
-            </a:r>
-            <a:r>
-              <a:rPr lang="en-US" sz="4500">
-                <a:solidFill>
-                  <a:srgbClr val="000000"/>
-                </a:solidFill>
-                <a:latin typeface="Open Sans Bold"/>
-              </a:rPr>
-              <a:t>m</a:t>
-            </a:r>
-            <a:r>
-              <a:rPr lang="en-US" sz="4500">
-                <a:solidFill>
-                  <a:srgbClr val="000000"/>
-                </a:solidFill>
-                <a:latin typeface="Open Sans Bold"/>
-              </a:rPr>
-              <a:t>b</a:t>
-            </a:r>
-            <a:r>
-              <a:rPr lang="en-US" sz="4500">
-                <a:solidFill>
-                  <a:srgbClr val="000000"/>
-                </a:solidFill>
-                <a:latin typeface="Open Sans Bold"/>
-              </a:rPr>
-              <a:t>er</a:t>
+              <a:t>PS Number</a:t>
             </a:r>
             <a:r>
               <a:rPr lang="en-US" sz="4500">
@@ -8575,25 +8429,7 @@
                 </a:solidFill>
                 <a:latin typeface="Open Sans"/>
               </a:rPr>
-              <a:t> : T</a:t>
-            </a:r>
-            <a:r>
-              <a:rPr lang="en-US" sz="4500">
-                <a:solidFill>
-                  <a:srgbClr val="000000"/>
-                </a:solidFill>
-                <a:latin typeface="Open Sans"/>
-              </a:rPr>
-              <a:t>he</a:t>
-            </a:r>
-            <a:r>
-              <a:rPr lang="en-US" sz="4500">
-                <a:solidFill>
-                  <a:srgbClr val="000000"/>
-                </a:solidFill>
-                <a:latin typeface="Open Sans"/>
-              </a:rPr>
-              <a:t> Ones n Zeros</a:t>
+              <a:t> : The Ones n Zeros</a:t>
             </a:r>
           </a:p>
           <a:p>
@@ -8609,70 +8445,16 @@
                 </a:solidFill>
                 <a:latin typeface="Open Sans Bold"/>
               </a:rPr>
-              <a:t>Team Le</a:t>
+              <a:t>Team Leader Name</a:t>
             </a:r>
             <a:r>
               <a:rPr lang="en-US" sz="4500">
                 <a:solidFill>
                   <a:srgbClr val="000000"/>
                 </a:solidFill>
-                <a:latin typeface="Open Sans Bold"/>
-              </a:rPr>
-              <a:t>ad</a:t>
-            </a:r>
-            <a:r>
-              <a:rPr lang="en-US" sz="4500">
-                <a:solidFill>
-                  <a:srgbClr val="000000"/>
-                </a:solidFill>
-                <a:latin typeface="Open Sans Bold"/>
-              </a:rPr>
-              <a:t>er Name</a:t>
-            </a:r>
-            <a:r>
-              <a:rPr lang="en-US" sz="4500">
-                <a:solidFill>
-                  <a:srgbClr val="000000"/>
-                </a:solidFill>
-                <a:latin typeface="Open Sans"/>
-              </a:rPr>
-              <a:t> : V</a:t>
-            </a:r>
-            <a:r>
-              <a:rPr lang="en-US" sz="4500">
-                <a:solidFill>
-                  <a:srgbClr val="000000"/>
-                </a:solidFill>
-                <a:latin typeface="Open Sans"/>
-              </a:rPr>
-              <a:t>i</a:t>
-            </a:r>
-            <a:r>
-              <a:rPr lang="en-US" sz="4500">
-                <a:solidFill>
-                  <a:srgbClr val="000000"/>
-                </a:solidFill>
-                <a:latin typeface="Open Sans"/>
-              </a:rPr>
-              <a:t>g</a:t>
-            </a:r>
-            <a:r>
-              <a:rPr lang="en-US" sz="4500">
-                <a:solidFill>
-                  <a:srgbClr val="000000"/>
-                </a:solidFill>
-                <a:latin typeface="Open Sans"/>
-              </a:rPr>
-              <a:t>n</a:t>
-            </a:r>
-            <a:r>
-              <a:rPr lang="en-US" sz="4500">
-                <a:solidFill>
-                  <a:srgbClr val="000000"/>
-                </a:solidFill>
-                <a:latin typeface="Open Sans"/>
-              </a:rPr>
-              <a:t>esh Charan Raman</a:t>
+                <a:latin typeface="Open Sans"/>
+              </a:rPr>
+              <a:t> : Vignesh Charan Raman</a:t>
             </a:r>
           </a:p>
           <a:p>
@@ -8688,25 +8470,7 @@
                 </a:solidFill>
                 <a:latin typeface="Open Sans Bold"/>
               </a:rPr>
-              <a:t>Colle</a:t>
-            </a:r>
-            <a:r>
-              <a:rPr lang="en-US" sz="4500">
-                <a:solidFill>
-                  <a:srgbClr val="000000"/>
-                </a:solidFill>
-                <a:latin typeface="Open Sans Bold"/>
-              </a:rPr>
-              <a:t>g</a:t>
-            </a:r>
-            <a:r>
-              <a:rPr lang="en-US" sz="4500">
-                <a:solidFill>
-                  <a:srgbClr val="000000"/>
-                </a:solidFill>
-                <a:latin typeface="Open Sans Bold"/>
-              </a:rPr>
-              <a:t>e code</a:t>
+              <a:t>College code</a:t>
             </a:r>
             <a:r>
               <a:rPr lang="en-US" sz="4500">
@@ -8724,6 +8488,12 @@
                 <a:spcPts val="6299"/>
               </a:lnSpc>
             </a:pPr>
+            <a:endParaRPr lang="en-US" sz="4500">
+              <a:solidFill>
+                <a:srgbClr val="000000"/>
+              </a:solidFill>
+              <a:latin typeface="Open Sans"/>
+            </a:endParaRPr>
           </a:p>
         </p:txBody>
       </p:sp>
@@ -8736,7 +8506,7 @@
 </file>
 
 <file path=ppt/slides/slide3.xml><?xml version="1.0" encoding="utf-8"?>
-<p:sld xmlns:p="http://schemas.openxmlformats.org/presentationml/2006/main" xmlns:a="http://schemas.openxmlformats.org/drawingml/2006/main">
+<p:sld xmlns:a="http://schemas.openxmlformats.org/drawingml/2006/main" xmlns:r="http://schemas.openxmlformats.org/officeDocument/2006/relationships" xmlns:p="http://schemas.openxmlformats.org/presentationml/2006/main">
   <p:cSld>
     <p:spTree>
       <p:nvGrpSpPr>
@@ -8754,21 +8524,21 @@
       </p:grpSpPr>
       <p:grpSp>
         <p:nvGrpSpPr>
-          <p:cNvPr name="Group 2" id="2"/>
+          <p:cNvPr id="2" name="Group 2"/>
           <p:cNvGrpSpPr/>
           <p:nvPr/>
         </p:nvGrpSpPr>
         <p:grpSpPr>
-          <a:xfrm rot="0">
-            <a:off x="-399792" y="-203994"/>
-            <a:ext cx="19427467" cy="2267164"/>
+          <a:xfrm>
+            <a:off x="1" y="-203994"/>
+            <a:ext cx="18288000" cy="2267164"/>
             <a:chOff x="0" y="0"/>
             <a:chExt cx="5629405" cy="656945"/>
           </a:xfrm>
         </p:grpSpPr>
         <p:sp>
           <p:nvSpPr>
-            <p:cNvPr name="Freeform 3" id="3"/>
+            <p:cNvPr id="3" name="Freeform 3"/>
             <p:cNvSpPr/>
             <p:nvPr/>
           </p:nvSpPr>
@@ -8782,9 +8552,9 @@
               <a:gdLst/>
               <a:ahLst/>
               <a:cxnLst/>
-              <a:rect r="r" b="b" t="t" l="l"/>
+              <a:rect l="l" t="t" r="r" b="b"/>
               <a:pathLst>
-                <a:path h="656945" w="5629406">
+                <a:path w="5629406" h="656945">
                   <a:moveTo>
                     <a:pt x="0" y="0"/>
                   </a:moveTo>
@@ -8809,12 +8579,12 @@
       </p:grpSp>
       <p:sp>
         <p:nvSpPr>
-          <p:cNvPr name="TextBox 4" id="4"/>
-          <p:cNvSpPr txBox="true"/>
+          <p:cNvPr id="4" name="TextBox 4"/>
+          <p:cNvSpPr txBox="1"/>
           <p:nvPr/>
         </p:nvSpPr>
         <p:spPr>
-          <a:xfrm rot="0">
+          <a:xfrm>
             <a:off x="1028700" y="180975"/>
             <a:ext cx="10802243" cy="1533525"/>
           </a:xfrm>
@@ -8823,7 +8593,7 @@
           </a:prstGeom>
         </p:spPr>
         <p:txBody>
-          <a:bodyPr anchor="t" rtlCol="false" tIns="0" lIns="0" bIns="0" rIns="0">
+          <a:bodyPr lIns="0" tIns="0" rIns="0" bIns="0" rtlCol="0" anchor="t">
             <a:spAutoFit/>
           </a:bodyPr>
           <a:lstStyle/>
@@ -8847,12 +8617,12 @@
       </p:sp>
       <p:sp>
         <p:nvSpPr>
-          <p:cNvPr name="TextBox 5" id="5"/>
-          <p:cNvSpPr txBox="true"/>
+          <p:cNvPr id="5" name="TextBox 5"/>
+          <p:cNvSpPr txBox="1"/>
           <p:nvPr/>
         </p:nvSpPr>
         <p:spPr>
-          <a:xfrm rot="0">
+          <a:xfrm>
             <a:off x="1028700" y="4577735"/>
             <a:ext cx="16230600" cy="4680565"/>
           </a:xfrm>
@@ -8861,7 +8631,7 @@
           </a:prstGeom>
         </p:spPr>
         <p:txBody>
-          <a:bodyPr anchor="t" rtlCol="false" tIns="0" lIns="0" bIns="0" rIns="0">
+          <a:bodyPr lIns="0" tIns="0" rIns="0" bIns="0" rtlCol="0" anchor="t">
             <a:spAutoFit/>
           </a:bodyPr>
           <a:lstStyle/>
@@ -8878,28 +8648,19 @@
                 </a:solidFill>
                 <a:latin typeface="Open Sans"/>
               </a:rPr>
-              <a:t>Short Wave Infra-Re</a:t>
-            </a:r>
-            <a:r>
-              <a:rPr lang="en-US" sz="4500">
-                <a:solidFill>
-                  <a:srgbClr val="000000"/>
-                </a:solidFill>
-                <a:latin typeface="Open Sans"/>
-              </a:rPr>
-              <a:t>d(SWIR) detectors used in satellite imaging cameras suffer from dropouts in pixel and line direction in raw data. Develop software to reconstruct missing parts of a satellite image so that observers are unable to identify regions that have undergone reconstruction</a:t>
+              <a:t>Short Wave Infra-Red(SWIR) detectors used in satellite imaging cameras suffer from dropouts in pixel and line direction in raw data. Develop software to reconstruct missing parts of a satellite image so that observers are unable to identify regions that have undergone reconstruction</a:t>
             </a:r>
           </a:p>
         </p:txBody>
       </p:sp>
       <p:sp>
         <p:nvSpPr>
-          <p:cNvPr name="TextBox 6" id="6"/>
-          <p:cNvSpPr txBox="true"/>
+          <p:cNvPr id="6" name="TextBox 6"/>
+          <p:cNvSpPr txBox="1"/>
           <p:nvPr/>
         </p:nvSpPr>
         <p:spPr>
-          <a:xfrm rot="0">
+          <a:xfrm>
             <a:off x="1028700" y="2434158"/>
             <a:ext cx="15846597" cy="1811020"/>
           </a:xfrm>
@@ -8908,7 +8669,7 @@
           </a:prstGeom>
         </p:spPr>
         <p:txBody>
-          <a:bodyPr anchor="t" rtlCol="false" tIns="0" lIns="0" bIns="0" rIns="0">
+          <a:bodyPr lIns="0" tIns="0" rIns="0" bIns="0" rtlCol="0" anchor="t">
             <a:spAutoFit/>
           </a:bodyPr>
           <a:lstStyle/>
@@ -8939,7 +8700,7 @@
 </file>
 
 <file path=ppt/slides/slide4.xml><?xml version="1.0" encoding="utf-8"?>
-<p:sld xmlns:p="http://schemas.openxmlformats.org/presentationml/2006/main" xmlns:a="http://schemas.openxmlformats.org/drawingml/2006/main" xmlns:r="http://schemas.openxmlformats.org/officeDocument/2006/relationships">
+<p:sld xmlns:a="http://schemas.openxmlformats.org/drawingml/2006/main" xmlns:r="http://schemas.openxmlformats.org/officeDocument/2006/relationships" xmlns:p="http://schemas.openxmlformats.org/presentationml/2006/main">
   <p:cSld>
     <p:spTree>
       <p:nvGrpSpPr>
@@ -8957,21 +8718,21 @@
       </p:grpSpPr>
       <p:grpSp>
         <p:nvGrpSpPr>
-          <p:cNvPr name="Group 2" id="2"/>
+          <p:cNvPr id="2" name="Group 2"/>
           <p:cNvGrpSpPr/>
           <p:nvPr/>
         </p:nvGrpSpPr>
         <p:grpSpPr>
-          <a:xfrm rot="0">
-            <a:off x="-399792" y="-203994"/>
-            <a:ext cx="19427467" cy="2267164"/>
+          <a:xfrm>
+            <a:off x="1" y="-203994"/>
+            <a:ext cx="18288000" cy="2267164"/>
             <a:chOff x="0" y="0"/>
             <a:chExt cx="5629405" cy="656945"/>
           </a:xfrm>
         </p:grpSpPr>
         <p:sp>
           <p:nvSpPr>
-            <p:cNvPr name="Freeform 3" id="3"/>
+            <p:cNvPr id="3" name="Freeform 3"/>
             <p:cNvSpPr/>
             <p:nvPr/>
           </p:nvSpPr>
@@ -8985,9 +8746,9 @@
               <a:gdLst/>
               <a:ahLst/>
               <a:cxnLst/>
-              <a:rect r="r" b="b" t="t" l="l"/>
+              <a:rect l="l" t="t" r="r" b="b"/>
               <a:pathLst>
-                <a:path h="656945" w="5629406">
+                <a:path w="5629406" h="656945">
                   <a:moveTo>
                     <a:pt x="0" y="0"/>
                   </a:moveTo>
@@ -9012,21 +8773,21 @@
       </p:grpSp>
       <p:pic>
         <p:nvPicPr>
-          <p:cNvPr name="Picture 4" id="4"/>
+          <p:cNvPr id="4" name="Picture 4"/>
           <p:cNvPicPr>
-            <a:picLocks noChangeAspect="true"/>
+            <a:picLocks noChangeAspect="1"/>
           </p:cNvPicPr>
           <p:nvPr/>
         </p:nvPicPr>
         <p:blipFill>
           <a:blip r:embed="rId2"/>
-          <a:srcRect l="0" t="0" r="0" b="0"/>
+          <a:srcRect/>
           <a:stretch>
             <a:fillRect/>
           </a:stretch>
         </p:blipFill>
         <p:spPr>
-          <a:xfrm flipH="false" flipV="false" rot="0">
+          <a:xfrm>
             <a:off x="1028700" y="2275153"/>
             <a:ext cx="8385801" cy="7633093"/>
           </a:xfrm>
@@ -9037,12 +8798,12 @@
       </p:pic>
       <p:sp>
         <p:nvSpPr>
-          <p:cNvPr name="TextBox 5" id="5"/>
-          <p:cNvSpPr txBox="true"/>
+          <p:cNvPr id="5" name="TextBox 5"/>
+          <p:cNvSpPr txBox="1"/>
           <p:nvPr/>
         </p:nvSpPr>
         <p:spPr>
-          <a:xfrm rot="0">
+          <a:xfrm>
             <a:off x="1028700" y="180975"/>
             <a:ext cx="13888463" cy="1533525"/>
           </a:xfrm>
@@ -9051,7 +8812,7 @@
           </a:prstGeom>
         </p:spPr>
         <p:txBody>
-          <a:bodyPr anchor="t" rtlCol="false" tIns="0" lIns="0" bIns="0" rIns="0">
+          <a:bodyPr lIns="0" tIns="0" rIns="0" bIns="0" rtlCol="0" anchor="t">
             <a:spAutoFit/>
           </a:bodyPr>
           <a:lstStyle/>
@@ -9075,12 +8836,12 @@
       </p:sp>
       <p:sp>
         <p:nvSpPr>
-          <p:cNvPr name="TextBox 6" id="6"/>
-          <p:cNvSpPr txBox="true"/>
+          <p:cNvPr id="6" name="TextBox 6"/>
+          <p:cNvSpPr txBox="1"/>
           <p:nvPr/>
         </p:nvSpPr>
         <p:spPr>
-          <a:xfrm rot="0">
+          <a:xfrm>
             <a:off x="9821530" y="2535181"/>
             <a:ext cx="7437770" cy="7083682"/>
           </a:xfrm>
@@ -9089,12 +8850,12 @@
           </a:prstGeom>
         </p:spPr>
         <p:txBody>
-          <a:bodyPr anchor="t" rtlCol="false" tIns="0" lIns="0" bIns="0" rIns="0">
+          <a:bodyPr lIns="0" tIns="0" rIns="0" bIns="0" rtlCol="0" anchor="t">
             <a:spAutoFit/>
           </a:bodyPr>
           <a:lstStyle/>
           <a:p>
-            <a:pPr algn="l" marL="971550" indent="-485775" lvl="1">
+            <a:pPr marL="971550" lvl="1" indent="-485775" algn="l">
               <a:lnSpc>
                 <a:spcPts val="6299"/>
               </a:lnSpc>
@@ -9112,7 +8873,7 @@
             </a:r>
           </a:p>
           <a:p>
-            <a:pPr algn="l" marL="971550" indent="-485775" lvl="1">
+            <a:pPr marL="971550" lvl="1" indent="-485775" algn="l">
               <a:lnSpc>
                 <a:spcPts val="6299"/>
               </a:lnSpc>
@@ -9130,7 +8891,7 @@
             </a:r>
           </a:p>
           <a:p>
-            <a:pPr algn="l" marL="971550" indent="-485775" lvl="1">
+            <a:pPr marL="971550" lvl="1" indent="-485775" algn="l">
               <a:lnSpc>
                 <a:spcPts val="6299"/>
               </a:lnSpc>
@@ -9148,7 +8909,7 @@
             </a:r>
           </a:p>
           <a:p>
-            <a:pPr algn="l" marL="971550" indent="-485775" lvl="1">
+            <a:pPr marL="971550" lvl="1" indent="-485775" algn="l">
               <a:lnSpc>
                 <a:spcPts val="6299"/>
               </a:lnSpc>
@@ -9166,7 +8927,7 @@
             </a:r>
           </a:p>
           <a:p>
-            <a:pPr algn="l" marL="971550" indent="-485775" lvl="1">
+            <a:pPr marL="971550" lvl="1" indent="-485775" algn="l">
               <a:lnSpc>
                 <a:spcPts val="6299"/>
               </a:lnSpc>
@@ -9194,7 +8955,7 @@
 </file>
 
 <file path=ppt/slides/slide5.xml><?xml version="1.0" encoding="utf-8"?>
-<p:sld xmlns:p="http://schemas.openxmlformats.org/presentationml/2006/main" xmlns:a="http://schemas.openxmlformats.org/drawingml/2006/main" xmlns:r="http://schemas.openxmlformats.org/officeDocument/2006/relationships">
+<p:sld xmlns:a="http://schemas.openxmlformats.org/drawingml/2006/main" xmlns:r="http://schemas.openxmlformats.org/officeDocument/2006/relationships" xmlns:p="http://schemas.openxmlformats.org/presentationml/2006/main">
   <p:cSld>
     <p:spTree>
       <p:nvGrpSpPr>
@@ -9212,21 +8973,21 @@
       </p:grpSpPr>
       <p:grpSp>
         <p:nvGrpSpPr>
-          <p:cNvPr name="Group 2" id="2"/>
+          <p:cNvPr id="2" name="Group 2"/>
           <p:cNvGrpSpPr/>
           <p:nvPr/>
         </p:nvGrpSpPr>
         <p:grpSpPr>
-          <a:xfrm rot="0">
-            <a:off x="-399792" y="-203994"/>
-            <a:ext cx="19427467" cy="2436360"/>
+          <a:xfrm>
+            <a:off x="1" y="-203994"/>
+            <a:ext cx="18288000" cy="2436360"/>
             <a:chOff x="0" y="0"/>
             <a:chExt cx="5629405" cy="705973"/>
           </a:xfrm>
         </p:grpSpPr>
         <p:sp>
           <p:nvSpPr>
-            <p:cNvPr name="Freeform 3" id="3"/>
+            <p:cNvPr id="3" name="Freeform 3"/>
             <p:cNvSpPr/>
             <p:nvPr/>
           </p:nvSpPr>
@@ -9240,9 +9001,9 @@
               <a:gdLst/>
               <a:ahLst/>
               <a:cxnLst/>
-              <a:rect r="r" b="b" t="t" l="l"/>
+              <a:rect l="l" t="t" r="r" b="b"/>
               <a:pathLst>
-                <a:path h="705973" w="5629406">
+                <a:path w="5629406" h="705973">
                   <a:moveTo>
                     <a:pt x="0" y="0"/>
                   </a:moveTo>
@@ -9267,12 +9028,12 @@
       </p:grpSp>
       <p:sp>
         <p:nvSpPr>
-          <p:cNvPr name="TextBox 4" id="4"/>
-          <p:cNvSpPr txBox="true"/>
+          <p:cNvPr id="4" name="TextBox 4"/>
+          <p:cNvSpPr txBox="1"/>
           <p:nvPr/>
         </p:nvSpPr>
         <p:spPr>
-          <a:xfrm rot="0">
+          <a:xfrm>
             <a:off x="8341157" y="2469700"/>
             <a:ext cx="9229565" cy="7539801"/>
           </a:xfrm>
@@ -9281,12 +9042,12 @@
           </a:prstGeom>
         </p:spPr>
         <p:txBody>
-          <a:bodyPr anchor="t" rtlCol="false" tIns="0" lIns="0" bIns="0" rIns="0">
+          <a:bodyPr lIns="0" tIns="0" rIns="0" bIns="0" rtlCol="0" anchor="t">
             <a:spAutoFit/>
           </a:bodyPr>
           <a:lstStyle/>
           <a:p>
-            <a:pPr algn="l" marL="0" indent="0" lvl="0">
+            <a:pPr marL="0" lvl="0" indent="0" algn="l">
               <a:lnSpc>
                 <a:spcPts val="4071"/>
               </a:lnSpc>
@@ -9305,7 +9066,7 @@
             </a:r>
           </a:p>
           <a:p>
-            <a:pPr algn="l" marL="0" indent="0" lvl="0">
+            <a:pPr marL="0" lvl="0" indent="0" algn="l">
               <a:lnSpc>
                 <a:spcPts val="4071"/>
               </a:lnSpc>
@@ -9313,9 +9074,15 @@
                 <a:spcPct val="0"/>
               </a:spcBef>
             </a:pPr>
-          </a:p>
-          <a:p>
-            <a:pPr algn="l" marL="0" indent="0" lvl="0">
+            <a:endParaRPr lang="en-US" sz="2908" u="none">
+              <a:solidFill>
+                <a:srgbClr val="000000"/>
+              </a:solidFill>
+              <a:latin typeface="Open Sans"/>
+            </a:endParaRPr>
+          </a:p>
+          <a:p>
+            <a:pPr marL="0" lvl="0" indent="0" algn="l">
               <a:lnSpc>
                 <a:spcPts val="4071"/>
               </a:lnSpc>
@@ -9334,7 +9101,7 @@
             </a:r>
           </a:p>
           <a:p>
-            <a:pPr algn="l" marL="0" indent="0" lvl="0">
+            <a:pPr marL="0" lvl="0" indent="0" algn="l">
               <a:lnSpc>
                 <a:spcPts val="4071"/>
               </a:lnSpc>
@@ -9342,9 +9109,15 @@
                 <a:spcPct val="0"/>
               </a:spcBef>
             </a:pPr>
-          </a:p>
-          <a:p>
-            <a:pPr algn="l" marL="0" indent="0" lvl="0">
+            <a:endParaRPr lang="en-US" sz="2908" u="none">
+              <a:solidFill>
+                <a:srgbClr val="000000"/>
+              </a:solidFill>
+              <a:latin typeface="Open Sans"/>
+            </a:endParaRPr>
+          </a:p>
+          <a:p>
+            <a:pPr marL="0" lvl="0" indent="0" algn="l">
               <a:lnSpc>
                 <a:spcPts val="4071"/>
               </a:lnSpc>
@@ -9366,21 +9139,21 @@
       </p:sp>
       <p:pic>
         <p:nvPicPr>
-          <p:cNvPr name="Picture 5" id="5"/>
+          <p:cNvPr id="5" name="Picture 5"/>
           <p:cNvPicPr>
-            <a:picLocks noChangeAspect="true"/>
+            <a:picLocks noChangeAspect="1"/>
           </p:cNvPicPr>
           <p:nvPr/>
         </p:nvPicPr>
         <p:blipFill>
           <a:blip r:embed="rId2"/>
-          <a:srcRect l="0" t="0" r="0" b="0"/>
+          <a:srcRect/>
           <a:stretch>
             <a:fillRect/>
           </a:stretch>
         </p:blipFill>
         <p:spPr>
-          <a:xfrm flipH="false" flipV="false" rot="0">
+          <a:xfrm>
             <a:off x="1642925" y="2685262"/>
             <a:ext cx="5655787" cy="7156302"/>
           </a:xfrm>
@@ -9391,21 +9164,21 @@
       </p:pic>
       <p:sp>
         <p:nvSpPr>
-          <p:cNvPr name="TextBox 6" id="6"/>
-          <p:cNvSpPr txBox="true"/>
+          <p:cNvPr id="6" name="TextBox 6"/>
+          <p:cNvSpPr txBox="1"/>
           <p:nvPr/>
         </p:nvSpPr>
         <p:spPr>
-          <a:xfrm rot="0">
+          <a:xfrm>
             <a:off x="1028700" y="268288"/>
-            <a:ext cx="9785896" cy="1368425"/>
+            <a:ext cx="12382500" cy="1368425"/>
           </a:xfrm>
           <a:prstGeom prst="rect">
             <a:avLst/>
           </a:prstGeom>
         </p:spPr>
         <p:txBody>
-          <a:bodyPr anchor="t" rtlCol="false" tIns="0" lIns="0" bIns="0" rIns="0">
+          <a:bodyPr wrap="square" lIns="0" tIns="0" rIns="0" bIns="0" rtlCol="0" anchor="t">
             <a:spAutoFit/>
           </a:bodyPr>
           <a:lstStyle/>
@@ -9416,7 +9189,7 @@
               </a:lnSpc>
             </a:pPr>
             <a:r>
-              <a:rPr lang="en-US" sz="8000">
+              <a:rPr lang="en-US" sz="8000" dirty="0">
                 <a:solidFill>
                   <a:srgbClr val="FFFFFF"/>
                 </a:solidFill>
@@ -9436,7 +9209,7 @@
 </file>
 
 <file path=ppt/slides/slide6.xml><?xml version="1.0" encoding="utf-8"?>
-<p:sld xmlns:p="http://schemas.openxmlformats.org/presentationml/2006/main" xmlns:a="http://schemas.openxmlformats.org/drawingml/2006/main" xmlns:r="http://schemas.openxmlformats.org/officeDocument/2006/relationships">
+<p:sld xmlns:a="http://schemas.openxmlformats.org/drawingml/2006/main" xmlns:r="http://schemas.openxmlformats.org/officeDocument/2006/relationships" xmlns:p="http://schemas.openxmlformats.org/presentationml/2006/main">
   <p:cSld>
     <p:spTree>
       <p:nvGrpSpPr>
@@ -9454,12 +9227,12 @@
       </p:grpSpPr>
       <p:grpSp>
         <p:nvGrpSpPr>
-          <p:cNvPr name="Group 2" id="2"/>
+          <p:cNvPr id="2" name="Group 2"/>
           <p:cNvGrpSpPr/>
           <p:nvPr/>
         </p:nvGrpSpPr>
         <p:grpSpPr>
-          <a:xfrm rot="0">
+          <a:xfrm>
             <a:off x="-399792" y="-203994"/>
             <a:ext cx="19427467" cy="2097967"/>
             <a:chOff x="0" y="0"/>
@@ -9468,7 +9241,7 @@
         </p:grpSpPr>
         <p:sp>
           <p:nvSpPr>
-            <p:cNvPr name="Freeform 3" id="3"/>
+            <p:cNvPr id="3" name="Freeform 3"/>
             <p:cNvSpPr/>
             <p:nvPr/>
           </p:nvSpPr>
@@ -9482,9 +9255,9 @@
               <a:gdLst/>
               <a:ahLst/>
               <a:cxnLst/>
-              <a:rect r="r" b="b" t="t" l="l"/>
+              <a:rect l="l" t="t" r="r" b="b"/>
               <a:pathLst>
-                <a:path h="607918" w="5629406">
+                <a:path w="5629406" h="607918">
                   <a:moveTo>
                     <a:pt x="0" y="0"/>
                   </a:moveTo>
@@ -9509,21 +9282,21 @@
       </p:grpSp>
       <p:sp>
         <p:nvSpPr>
-          <p:cNvPr name="TextBox 4" id="4"/>
-          <p:cNvSpPr txBox="true"/>
+          <p:cNvPr id="4" name="TextBox 4"/>
+          <p:cNvSpPr txBox="1"/>
           <p:nvPr/>
         </p:nvSpPr>
         <p:spPr>
-          <a:xfrm rot="0">
+          <a:xfrm>
             <a:off x="1028700" y="190500"/>
-            <a:ext cx="11281023" cy="1368425"/>
+            <a:ext cx="14516100" cy="1368425"/>
           </a:xfrm>
           <a:prstGeom prst="rect">
             <a:avLst/>
           </a:prstGeom>
         </p:spPr>
         <p:txBody>
-          <a:bodyPr anchor="t" rtlCol="false" tIns="0" lIns="0" bIns="0" rIns="0">
+          <a:bodyPr wrap="square" lIns="0" tIns="0" rIns="0" bIns="0" rtlCol="0" anchor="t">
             <a:spAutoFit/>
           </a:bodyPr>
           <a:lstStyle/>
@@ -9534,34 +9307,34 @@
               </a:lnSpc>
             </a:pPr>
             <a:r>
-              <a:rPr lang="en-US" sz="8000">
+              <a:rPr lang="en-US" sz="8000" dirty="0">
                 <a:solidFill>
                   <a:srgbClr val="FFFFFF"/>
                 </a:solidFill>
                 <a:latin typeface="Open Sans Extra Bold"/>
               </a:rPr>
-              <a:t>Architechture of GAN</a:t>
+              <a:t>Architecture of GAN</a:t>
             </a:r>
           </a:p>
         </p:txBody>
       </p:sp>
       <p:pic>
         <p:nvPicPr>
-          <p:cNvPr name="Picture 5" id="5"/>
+          <p:cNvPr id="5" name="Picture 5"/>
           <p:cNvPicPr>
-            <a:picLocks noChangeAspect="true"/>
+            <a:picLocks noChangeAspect="1"/>
           </p:cNvPicPr>
           <p:nvPr/>
         </p:nvPicPr>
         <p:blipFill>
           <a:blip r:embed="rId2"/>
-          <a:srcRect l="0" t="0" r="0" b="0"/>
+          <a:srcRect/>
           <a:stretch>
             <a:fillRect/>
           </a:stretch>
         </p:blipFill>
         <p:spPr>
-          <a:xfrm flipH="false" flipV="false" rot="0">
+          <a:xfrm>
             <a:off x="641204" y="2441770"/>
             <a:ext cx="8672737" cy="7142254"/>
           </a:xfrm>
@@ -9572,12 +9345,12 @@
       </p:pic>
       <p:sp>
         <p:nvSpPr>
-          <p:cNvPr name="TextBox 6" id="6"/>
-          <p:cNvSpPr txBox="true"/>
+          <p:cNvPr id="6" name="TextBox 6"/>
+          <p:cNvSpPr txBox="1"/>
           <p:nvPr/>
         </p:nvSpPr>
         <p:spPr>
-          <a:xfrm rot="0">
+          <a:xfrm>
             <a:off x="10717570" y="2346520"/>
             <a:ext cx="3165574" cy="887095"/>
           </a:xfrm>
@@ -9586,7 +9359,7 @@
           </a:prstGeom>
         </p:spPr>
         <p:txBody>
-          <a:bodyPr anchor="t" rtlCol="false" tIns="0" lIns="0" bIns="0" rIns="0">
+          <a:bodyPr lIns="0" tIns="0" rIns="0" bIns="0" rtlCol="0" anchor="t">
             <a:spAutoFit/>
           </a:bodyPr>
           <a:lstStyle/>
@@ -9610,21 +9383,21 @@
       </p:sp>
       <p:sp>
         <p:nvSpPr>
-          <p:cNvPr name="TextBox 7" id="7"/>
-          <p:cNvSpPr txBox="true"/>
+          <p:cNvPr id="7" name="TextBox 7"/>
+          <p:cNvSpPr txBox="1"/>
           <p:nvPr/>
         </p:nvSpPr>
         <p:spPr>
-          <a:xfrm rot="0">
+          <a:xfrm>
             <a:off x="14628451" y="2471615"/>
-            <a:ext cx="1942207" cy="762000"/>
+            <a:ext cx="2211749" cy="762000"/>
           </a:xfrm>
           <a:prstGeom prst="rect">
             <a:avLst/>
           </a:prstGeom>
         </p:spPr>
         <p:txBody>
-          <a:bodyPr anchor="t" rtlCol="false" tIns="0" lIns="0" bIns="0" rIns="0">
+          <a:bodyPr wrap="square" lIns="0" tIns="0" rIns="0" bIns="0" rtlCol="0" anchor="t">
             <a:spAutoFit/>
           </a:bodyPr>
           <a:lstStyle/>
@@ -9635,7 +9408,7 @@
               </a:lnSpc>
             </a:pPr>
             <a:r>
-              <a:rPr lang="en-US" sz="4500">
+              <a:rPr lang="en-US" sz="4500" dirty="0">
                 <a:solidFill>
                   <a:srgbClr val="000000"/>
                 </a:solidFill>
@@ -9648,12 +9421,12 @@
       </p:sp>
       <p:sp>
         <p:nvSpPr>
-          <p:cNvPr name="TextBox 8" id="8"/>
-          <p:cNvSpPr txBox="true"/>
+          <p:cNvPr id="8" name="TextBox 8"/>
+          <p:cNvSpPr txBox="1"/>
           <p:nvPr/>
         </p:nvSpPr>
         <p:spPr>
-          <a:xfrm rot="0">
+          <a:xfrm>
             <a:off x="10127033" y="4007409"/>
             <a:ext cx="7512223" cy="4744244"/>
           </a:xfrm>
@@ -9662,12 +9435,12 @@
           </a:prstGeom>
         </p:spPr>
         <p:txBody>
-          <a:bodyPr anchor="t" rtlCol="false" tIns="0" lIns="0" bIns="0" rIns="0">
+          <a:bodyPr lIns="0" tIns="0" rIns="0" bIns="0" rtlCol="0" anchor="t">
             <a:spAutoFit/>
           </a:bodyPr>
           <a:lstStyle/>
           <a:p>
-            <a:pPr algn="l" marL="0" indent="0" lvl="0">
+            <a:pPr marL="0" lvl="0" indent="0" algn="l">
               <a:lnSpc>
                 <a:spcPts val="6299"/>
               </a:lnSpc>
@@ -9686,7 +9459,7 @@
             </a:r>
           </a:p>
           <a:p>
-            <a:pPr algn="l" marL="0" indent="0" lvl="0">
+            <a:pPr marL="0" lvl="0" indent="0" algn="l">
               <a:lnSpc>
                 <a:spcPts val="6299"/>
               </a:lnSpc>
@@ -9715,7 +9488,7 @@
 </file>
 
 <file path=ppt/slides/slide7.xml><?xml version="1.0" encoding="utf-8"?>
-<p:sld xmlns:p="http://schemas.openxmlformats.org/presentationml/2006/main" xmlns:a="http://schemas.openxmlformats.org/drawingml/2006/main" xmlns:r="http://schemas.openxmlformats.org/officeDocument/2006/relationships">
+<p:sld xmlns:a="http://schemas.openxmlformats.org/drawingml/2006/main" xmlns:r="http://schemas.openxmlformats.org/officeDocument/2006/relationships" xmlns:p="http://schemas.openxmlformats.org/presentationml/2006/main">
   <p:cSld>
     <p:spTree>
       <p:nvGrpSpPr>
@@ -9733,12 +9506,12 @@
       </p:grpSpPr>
       <p:grpSp>
         <p:nvGrpSpPr>
-          <p:cNvPr name="Group 2" id="2"/>
+          <p:cNvPr id="2" name="Group 2"/>
           <p:cNvGrpSpPr/>
           <p:nvPr/>
         </p:nvGrpSpPr>
         <p:grpSpPr>
-          <a:xfrm rot="0">
+          <a:xfrm>
             <a:off x="-399792" y="-203994"/>
             <a:ext cx="19427467" cy="2097967"/>
             <a:chOff x="0" y="0"/>
@@ -9747,7 +9520,7 @@
         </p:grpSpPr>
         <p:sp>
           <p:nvSpPr>
-            <p:cNvPr name="Freeform 3" id="3"/>
+            <p:cNvPr id="3" name="Freeform 3"/>
             <p:cNvSpPr/>
             <p:nvPr/>
           </p:nvSpPr>
@@ -9761,9 +9534,9 @@
               <a:gdLst/>
               <a:ahLst/>
               <a:cxnLst/>
-              <a:rect r="r" b="b" t="t" l="l"/>
+              <a:rect l="l" t="t" r="r" b="b"/>
               <a:pathLst>
-                <a:path h="607918" w="5629406">
+                <a:path w="5629406" h="607918">
                   <a:moveTo>
                     <a:pt x="0" y="0"/>
                   </a:moveTo>
@@ -9788,12 +9561,12 @@
       </p:grpSp>
       <p:sp>
         <p:nvSpPr>
-          <p:cNvPr name="TextBox 4" id="4"/>
-          <p:cNvSpPr txBox="true"/>
+          <p:cNvPr id="4" name="TextBox 4"/>
+          <p:cNvSpPr txBox="1"/>
           <p:nvPr/>
         </p:nvSpPr>
         <p:spPr>
-          <a:xfrm rot="0">
+          <a:xfrm>
             <a:off x="1028700" y="190500"/>
             <a:ext cx="11281023" cy="1368425"/>
           </a:xfrm>
@@ -9802,7 +9575,7 @@
           </a:prstGeom>
         </p:spPr>
         <p:txBody>
-          <a:bodyPr anchor="t" rtlCol="false" tIns="0" lIns="0" bIns="0" rIns="0">
+          <a:bodyPr lIns="0" tIns="0" rIns="0" bIns="0" rtlCol="0" anchor="t">
             <a:spAutoFit/>
           </a:bodyPr>
           <a:lstStyle/>
@@ -9813,34 +9586,34 @@
               </a:lnSpc>
             </a:pPr>
             <a:r>
-              <a:rPr lang="en-US" sz="8000">
+              <a:rPr lang="en-US" sz="8000" dirty="0">
                 <a:solidFill>
                   <a:srgbClr val="FFFFFF"/>
                 </a:solidFill>
                 <a:latin typeface="Open Sans Extra Bold"/>
               </a:rPr>
-              <a:t>Architechture of GAN</a:t>
+              <a:t>Architecture of GAN</a:t>
             </a:r>
           </a:p>
         </p:txBody>
       </p:sp>
       <p:pic>
         <p:nvPicPr>
-          <p:cNvPr name="Picture 5" id="5"/>
+          <p:cNvPr id="5" name="Picture 5"/>
           <p:cNvPicPr>
-            <a:picLocks noChangeAspect="true"/>
+            <a:picLocks noChangeAspect="1"/>
           </p:cNvPicPr>
           <p:nvPr/>
         </p:nvPicPr>
         <p:blipFill>
           <a:blip r:embed="rId2"/>
-          <a:srcRect l="0" t="0" r="0" b="1055"/>
+          <a:srcRect b="1055"/>
           <a:stretch>
             <a:fillRect/>
           </a:stretch>
         </p:blipFill>
         <p:spPr>
-          <a:xfrm flipH="false" flipV="false" rot="0">
+          <a:xfrm>
             <a:off x="702028" y="3068201"/>
             <a:ext cx="9841547" cy="5567344"/>
           </a:xfrm>
@@ -9851,12 +9624,12 @@
       </p:pic>
       <p:sp>
         <p:nvSpPr>
-          <p:cNvPr name="TextBox 6" id="6"/>
-          <p:cNvSpPr txBox="true"/>
+          <p:cNvPr id="6" name="TextBox 6"/>
+          <p:cNvSpPr txBox="1"/>
           <p:nvPr/>
         </p:nvSpPr>
         <p:spPr>
-          <a:xfrm rot="0">
+          <a:xfrm>
             <a:off x="10988284" y="2972951"/>
             <a:ext cx="3165574" cy="887095"/>
           </a:xfrm>
@@ -9865,7 +9638,7 @@
           </a:prstGeom>
         </p:spPr>
         <p:txBody>
-          <a:bodyPr anchor="t" rtlCol="false" tIns="0" lIns="0" bIns="0" rIns="0">
+          <a:bodyPr lIns="0" tIns="0" rIns="0" bIns="0" rtlCol="0" anchor="t">
             <a:spAutoFit/>
           </a:bodyPr>
           <a:lstStyle/>
@@ -9889,21 +9662,21 @@
       </p:sp>
       <p:sp>
         <p:nvSpPr>
-          <p:cNvPr name="TextBox 7" id="7"/>
-          <p:cNvSpPr txBox="true"/>
+          <p:cNvPr id="7" name="TextBox 7"/>
+          <p:cNvSpPr txBox="1"/>
           <p:nvPr/>
         </p:nvSpPr>
         <p:spPr>
-          <a:xfrm rot="0">
-            <a:off x="15024649" y="3098046"/>
-            <a:ext cx="1942207" cy="762000"/>
+          <a:xfrm>
+            <a:off x="14856021" y="3035498"/>
+            <a:ext cx="2729951" cy="762000"/>
           </a:xfrm>
           <a:prstGeom prst="rect">
             <a:avLst/>
           </a:prstGeom>
         </p:spPr>
         <p:txBody>
-          <a:bodyPr anchor="t" rtlCol="false" tIns="0" lIns="0" bIns="0" rIns="0">
+          <a:bodyPr wrap="square" lIns="0" tIns="0" rIns="0" bIns="0" rtlCol="0" anchor="t">
             <a:spAutoFit/>
           </a:bodyPr>
           <a:lstStyle/>
@@ -9914,7 +9687,7 @@
               </a:lnSpc>
             </a:pPr>
             <a:r>
-              <a:rPr lang="en-US" sz="4500">
+              <a:rPr lang="en-US" sz="4500" dirty="0">
                 <a:solidFill>
                   <a:srgbClr val="000000"/>
                 </a:solidFill>
@@ -9927,12 +9700,12 @@
       </p:sp>
       <p:sp>
         <p:nvSpPr>
-          <p:cNvPr name="TextBox 8" id="8"/>
-          <p:cNvSpPr txBox="true"/>
+          <p:cNvPr id="8" name="TextBox 8"/>
+          <p:cNvSpPr txBox="1"/>
           <p:nvPr/>
         </p:nvSpPr>
         <p:spPr>
-          <a:xfrm rot="0">
+          <a:xfrm>
             <a:off x="12084626" y="4138028"/>
             <a:ext cx="4522440" cy="762000"/>
           </a:xfrm>
@@ -9941,7 +9714,7 @@
           </a:prstGeom>
         </p:spPr>
         <p:txBody>
-          <a:bodyPr anchor="t" rtlCol="false" tIns="0" lIns="0" bIns="0" rIns="0">
+          <a:bodyPr lIns="0" tIns="0" rIns="0" bIns="0" rtlCol="0" anchor="t">
             <a:spAutoFit/>
           </a:bodyPr>
           <a:lstStyle/>
@@ -9965,12 +9738,12 @@
       </p:sp>
       <p:sp>
         <p:nvSpPr>
-          <p:cNvPr name="TextBox 9" id="9"/>
-          <p:cNvSpPr txBox="true"/>
+          <p:cNvPr id="9" name="TextBox 9"/>
+          <p:cNvSpPr txBox="1"/>
           <p:nvPr/>
         </p:nvSpPr>
         <p:spPr>
-          <a:xfrm rot="0">
+          <a:xfrm>
             <a:off x="11776793" y="5095875"/>
             <a:ext cx="5190063" cy="4261603"/>
           </a:xfrm>
@@ -9979,12 +9752,12 @@
           </a:prstGeom>
         </p:spPr>
         <p:txBody>
-          <a:bodyPr anchor="t" rtlCol="false" tIns="0" lIns="0" bIns="0" rIns="0">
+          <a:bodyPr lIns="0" tIns="0" rIns="0" bIns="0" rtlCol="0" anchor="t">
             <a:spAutoFit/>
           </a:bodyPr>
           <a:lstStyle/>
           <a:p>
-            <a:pPr algn="l" marL="0" indent="0" lvl="0">
+            <a:pPr marL="0" lvl="0" indent="0" algn="l">
               <a:lnSpc>
                 <a:spcPts val="4323"/>
               </a:lnSpc>
@@ -10003,7 +9776,7 @@
             </a:r>
           </a:p>
           <a:p>
-            <a:pPr algn="l" marL="0" indent="0" lvl="0">
+            <a:pPr marL="0" lvl="0" indent="0" algn="l">
               <a:lnSpc>
                 <a:spcPts val="4323"/>
               </a:lnSpc>
@@ -10032,7 +9805,7 @@
 </file>
 
 <file path=ppt/slides/slide8.xml><?xml version="1.0" encoding="utf-8"?>
-<p:sld xmlns:p="http://schemas.openxmlformats.org/presentationml/2006/main" xmlns:a="http://schemas.openxmlformats.org/drawingml/2006/main" xmlns:r="http://schemas.openxmlformats.org/officeDocument/2006/relationships">
+<p:sld xmlns:a="http://schemas.openxmlformats.org/drawingml/2006/main" xmlns:r="http://schemas.openxmlformats.org/officeDocument/2006/relationships" xmlns:p="http://schemas.openxmlformats.org/presentationml/2006/main">
   <p:cSld>
     <p:spTree>
       <p:nvGrpSpPr>
@@ -10050,12 +9823,12 @@
       </p:grpSpPr>
       <p:grpSp>
         <p:nvGrpSpPr>
-          <p:cNvPr name="Group 2" id="2"/>
+          <p:cNvPr id="2" name="Group 2"/>
           <p:cNvGrpSpPr/>
           <p:nvPr/>
         </p:nvGrpSpPr>
         <p:grpSpPr>
-          <a:xfrm rot="0">
+          <a:xfrm>
             <a:off x="-399792" y="-203994"/>
             <a:ext cx="19427467" cy="2097967"/>
             <a:chOff x="0" y="0"/>
@@ -10064,7 +9837,7 @@
         </p:grpSpPr>
         <p:sp>
           <p:nvSpPr>
-            <p:cNvPr name="Freeform 3" id="3"/>
+            <p:cNvPr id="3" name="Freeform 3"/>
             <p:cNvSpPr/>
             <p:nvPr/>
           </p:nvSpPr>
@@ -10078,9 +9851,9 @@
               <a:gdLst/>
               <a:ahLst/>
               <a:cxnLst/>
-              <a:rect r="r" b="b" t="t" l="l"/>
+              <a:rect l="l" t="t" r="r" b="b"/>
               <a:pathLst>
-                <a:path h="607918" w="5629406">
+                <a:path w="5629406" h="607918">
                   <a:moveTo>
                     <a:pt x="0" y="0"/>
                   </a:moveTo>
@@ -10105,21 +9878,21 @@
       </p:grpSp>
       <p:sp>
         <p:nvSpPr>
-          <p:cNvPr name="TextBox 4" id="4"/>
-          <p:cNvSpPr txBox="true"/>
+          <p:cNvPr id="4" name="TextBox 4"/>
+          <p:cNvSpPr txBox="1"/>
           <p:nvPr/>
         </p:nvSpPr>
         <p:spPr>
-          <a:xfrm rot="0">
+          <a:xfrm>
             <a:off x="1028700" y="190500"/>
-            <a:ext cx="11281023" cy="1368425"/>
+            <a:ext cx="12534900" cy="1368425"/>
           </a:xfrm>
           <a:prstGeom prst="rect">
             <a:avLst/>
           </a:prstGeom>
         </p:spPr>
         <p:txBody>
-          <a:bodyPr anchor="t" rtlCol="false" tIns="0" lIns="0" bIns="0" rIns="0">
+          <a:bodyPr wrap="square" lIns="0" tIns="0" rIns="0" bIns="0" rtlCol="0" anchor="t">
             <a:spAutoFit/>
           </a:bodyPr>
           <a:lstStyle/>
@@ -10130,25 +9903,25 @@
               </a:lnSpc>
             </a:pPr>
             <a:r>
-              <a:rPr lang="en-US" sz="8000">
+              <a:rPr lang="en-US" sz="8000" dirty="0">
                 <a:solidFill>
                   <a:srgbClr val="FFFFFF"/>
                 </a:solidFill>
                 <a:latin typeface="Open Sans Extra Bold"/>
               </a:rPr>
-              <a:t>Architechture of GAN</a:t>
+              <a:t>Architecture of GAN</a:t>
             </a:r>
           </a:p>
         </p:txBody>
       </p:sp>
       <p:sp>
         <p:nvSpPr>
-          <p:cNvPr name="TextBox 5" id="5"/>
-          <p:cNvSpPr txBox="true"/>
+          <p:cNvPr id="5" name="TextBox 5"/>
+          <p:cNvSpPr txBox="1"/>
           <p:nvPr/>
         </p:nvSpPr>
         <p:spPr>
-          <a:xfrm rot="0">
+          <a:xfrm>
             <a:off x="10988284" y="2972951"/>
             <a:ext cx="3165574" cy="887095"/>
           </a:xfrm>
@@ -10157,7 +9930,7 @@
           </a:prstGeom>
         </p:spPr>
         <p:txBody>
-          <a:bodyPr anchor="t" rtlCol="false" tIns="0" lIns="0" bIns="0" rIns="0">
+          <a:bodyPr lIns="0" tIns="0" rIns="0" bIns="0" rtlCol="0" anchor="t">
             <a:spAutoFit/>
           </a:bodyPr>
           <a:lstStyle/>
@@ -10181,21 +9954,21 @@
       </p:sp>
       <p:sp>
         <p:nvSpPr>
-          <p:cNvPr name="TextBox 6" id="6"/>
-          <p:cNvSpPr txBox="true"/>
+          <p:cNvPr id="6" name="TextBox 6"/>
+          <p:cNvSpPr txBox="1"/>
           <p:nvPr/>
         </p:nvSpPr>
         <p:spPr>
-          <a:xfrm rot="0">
-            <a:off x="15024649" y="3098046"/>
-            <a:ext cx="1942207" cy="762000"/>
+          <a:xfrm>
+            <a:off x="14984880" y="3035498"/>
+            <a:ext cx="2577551" cy="762000"/>
           </a:xfrm>
           <a:prstGeom prst="rect">
             <a:avLst/>
           </a:prstGeom>
         </p:spPr>
         <p:txBody>
-          <a:bodyPr anchor="t" rtlCol="false" tIns="0" lIns="0" bIns="0" rIns="0">
+          <a:bodyPr wrap="square" lIns="0" tIns="0" rIns="0" bIns="0" rtlCol="0" anchor="t">
             <a:spAutoFit/>
           </a:bodyPr>
           <a:lstStyle/>
@@ -10206,7 +9979,7 @@
               </a:lnSpc>
             </a:pPr>
             <a:r>
-              <a:rPr lang="en-US" sz="4500">
+              <a:rPr lang="en-US" sz="4500" dirty="0">
                 <a:solidFill>
                   <a:srgbClr val="000000"/>
                 </a:solidFill>
@@ -10219,12 +9992,12 @@
       </p:sp>
       <p:sp>
         <p:nvSpPr>
-          <p:cNvPr name="TextBox 7" id="7"/>
-          <p:cNvSpPr txBox="true"/>
+          <p:cNvPr id="7" name="TextBox 7"/>
+          <p:cNvSpPr txBox="1"/>
           <p:nvPr/>
         </p:nvSpPr>
         <p:spPr>
-          <a:xfrm rot="0">
+          <a:xfrm>
             <a:off x="10988284" y="4579017"/>
             <a:ext cx="7116486" cy="4679283"/>
           </a:xfrm>
@@ -10233,12 +10006,12 @@
           </a:prstGeom>
         </p:spPr>
         <p:txBody>
-          <a:bodyPr anchor="t" rtlCol="false" tIns="0" lIns="0" bIns="0" rIns="0">
+          <a:bodyPr lIns="0" tIns="0" rIns="0" bIns="0" rtlCol="0" anchor="t">
             <a:spAutoFit/>
           </a:bodyPr>
           <a:lstStyle/>
           <a:p>
-            <a:pPr algn="l" marL="0" indent="0" lvl="0">
+            <a:pPr marL="0" lvl="0" indent="0" algn="l">
               <a:lnSpc>
                 <a:spcPts val="5296"/>
               </a:lnSpc>
@@ -10257,7 +10030,7 @@
             </a:r>
           </a:p>
           <a:p>
-            <a:pPr algn="l" marL="0" indent="0" lvl="0">
+            <a:pPr marL="0" lvl="0" indent="0" algn="l">
               <a:lnSpc>
                 <a:spcPts val="5296"/>
               </a:lnSpc>
@@ -10276,7 +10049,7 @@
             </a:r>
           </a:p>
           <a:p>
-            <a:pPr algn="l" marL="0" indent="0" lvl="0">
+            <a:pPr marL="0" lvl="0" indent="0" algn="l">
               <a:lnSpc>
                 <a:spcPts val="5296"/>
               </a:lnSpc>
@@ -10295,7 +10068,7 @@
             </a:r>
           </a:p>
           <a:p>
-            <a:pPr algn="l" marL="0" indent="0" lvl="0">
+            <a:pPr marL="0" lvl="0" indent="0" algn="l">
               <a:lnSpc>
                 <a:spcPts val="5296"/>
               </a:lnSpc>
@@ -10303,26 +10076,32 @@
                 <a:spcPct val="0"/>
               </a:spcBef>
             </a:pPr>
+            <a:endParaRPr lang="en-US" sz="3783" u="none">
+              <a:solidFill>
+                <a:srgbClr val="000000"/>
+              </a:solidFill>
+              <a:latin typeface="Open Sans"/>
+            </a:endParaRPr>
           </a:p>
         </p:txBody>
       </p:sp>
       <p:pic>
         <p:nvPicPr>
-          <p:cNvPr name="Picture 8" id="8"/>
+          <p:cNvPr id="8" name="Picture 8"/>
           <p:cNvPicPr>
-            <a:picLocks noChangeAspect="true"/>
+            <a:picLocks noChangeAspect="1"/>
           </p:cNvPicPr>
           <p:nvPr/>
         </p:nvPicPr>
         <p:blipFill>
           <a:blip r:embed="rId2"/>
-          <a:srcRect l="0" t="0" r="0" b="0"/>
+          <a:srcRect/>
           <a:stretch>
             <a:fillRect/>
           </a:stretch>
         </p:blipFill>
         <p:spPr>
-          <a:xfrm flipH="false" flipV="false" rot="0">
+          <a:xfrm>
             <a:off x="685800" y="2215021"/>
             <a:ext cx="9471462" cy="7541088"/>
           </a:xfrm>
@@ -10340,7 +10119,7 @@
 </file>
 
 <file path=ppt/slides/slide9.xml><?xml version="1.0" encoding="utf-8"?>
-<p:sld xmlns:p="http://schemas.openxmlformats.org/presentationml/2006/main" xmlns:a="http://schemas.openxmlformats.org/drawingml/2006/main" xmlns:r="http://schemas.openxmlformats.org/officeDocument/2006/relationships">
+<p:sld xmlns:a="http://schemas.openxmlformats.org/drawingml/2006/main" xmlns:r="http://schemas.openxmlformats.org/officeDocument/2006/relationships" xmlns:p="http://schemas.openxmlformats.org/presentationml/2006/main">
   <p:cSld>
     <p:spTree>
       <p:nvGrpSpPr>
@@ -10358,12 +10137,12 @@
       </p:grpSpPr>
       <p:grpSp>
         <p:nvGrpSpPr>
-          <p:cNvPr name="Group 2" id="2"/>
+          <p:cNvPr id="2" name="Group 2"/>
           <p:cNvGrpSpPr/>
           <p:nvPr/>
         </p:nvGrpSpPr>
         <p:grpSpPr>
-          <a:xfrm rot="0">
+          <a:xfrm>
             <a:off x="-399792" y="-203994"/>
             <a:ext cx="19427467" cy="2097967"/>
             <a:chOff x="0" y="0"/>
@@ -10372,7 +10151,7 @@
         </p:grpSpPr>
         <p:sp>
           <p:nvSpPr>
-            <p:cNvPr name="Freeform 3" id="3"/>
+            <p:cNvPr id="3" name="Freeform 3"/>
             <p:cNvSpPr/>
             <p:nvPr/>
           </p:nvSpPr>
@@ -10386,9 +10165,9 @@
               <a:gdLst/>
               <a:ahLst/>
               <a:cxnLst/>
-              <a:rect r="r" b="b" t="t" l="l"/>
+              <a:rect l="l" t="t" r="r" b="b"/>
               <a:pathLst>
-                <a:path h="607918" w="5629406">
+                <a:path w="5629406" h="607918">
                   <a:moveTo>
                     <a:pt x="0" y="0"/>
                   </a:moveTo>
@@ -10413,21 +10192,21 @@
       </p:grpSp>
       <p:sp>
         <p:nvSpPr>
-          <p:cNvPr name="TextBox 4" id="4"/>
-          <p:cNvSpPr txBox="true"/>
+          <p:cNvPr id="4" name="TextBox 4"/>
+          <p:cNvSpPr txBox="1"/>
           <p:nvPr/>
         </p:nvSpPr>
         <p:spPr>
-          <a:xfrm rot="0">
+          <a:xfrm>
             <a:off x="1028700" y="190500"/>
-            <a:ext cx="11281023" cy="1368425"/>
+            <a:ext cx="12306300" cy="1368425"/>
           </a:xfrm>
           <a:prstGeom prst="rect">
             <a:avLst/>
           </a:prstGeom>
         </p:spPr>
         <p:txBody>
-          <a:bodyPr anchor="t" rtlCol="false" tIns="0" lIns="0" bIns="0" rIns="0">
+          <a:bodyPr wrap="square" lIns="0" tIns="0" rIns="0" bIns="0" rtlCol="0" anchor="t">
             <a:spAutoFit/>
           </a:bodyPr>
           <a:lstStyle/>
@@ -10438,34 +10217,34 @@
               </a:lnSpc>
             </a:pPr>
             <a:r>
-              <a:rPr lang="en-US" sz="8000">
+              <a:rPr lang="en-US" sz="8000" dirty="0">
                 <a:solidFill>
                   <a:srgbClr val="FFFFFF"/>
                 </a:solidFill>
                 <a:latin typeface="Open Sans Extra Bold"/>
               </a:rPr>
-              <a:t>Architechture of GAN</a:t>
+              <a:t>Architecture of GAN</a:t>
             </a:r>
           </a:p>
         </p:txBody>
       </p:sp>
       <p:pic>
         <p:nvPicPr>
-          <p:cNvPr name="Picture 5" id="5"/>
+          <p:cNvPr id="5" name="Picture 5"/>
           <p:cNvPicPr>
-            <a:picLocks noChangeAspect="true"/>
+            <a:picLocks noChangeAspect="1"/>
           </p:cNvPicPr>
           <p:nvPr/>
         </p:nvPicPr>
         <p:blipFill>
           <a:blip r:embed="rId2"/>
-          <a:srcRect l="0" t="0" r="2464" b="0"/>
+          <a:srcRect r="2464"/>
           <a:stretch>
             <a:fillRect/>
           </a:stretch>
         </p:blipFill>
         <p:spPr>
-          <a:xfrm flipH="false" flipV="false" rot="0">
+          <a:xfrm>
             <a:off x="769640" y="2286445"/>
             <a:ext cx="14443433" cy="4120311"/>
           </a:xfrm>
@@ -10476,12 +10255,12 @@
       </p:pic>
       <p:sp>
         <p:nvSpPr>
-          <p:cNvPr name="TextBox 6" id="6"/>
-          <p:cNvSpPr txBox="true"/>
+          <p:cNvPr id="6" name="TextBox 6"/>
+          <p:cNvSpPr txBox="1"/>
           <p:nvPr/>
         </p:nvSpPr>
         <p:spPr>
-          <a:xfrm rot="0">
+          <a:xfrm>
             <a:off x="769640" y="6748542"/>
             <a:ext cx="4169866" cy="887095"/>
           </a:xfrm>
@@ -10490,7 +10269,7 @@
           </a:prstGeom>
         </p:spPr>
         <p:txBody>
-          <a:bodyPr anchor="t" rtlCol="false" tIns="0" lIns="0" bIns="0" rIns="0">
+          <a:bodyPr lIns="0" tIns="0" rIns="0" bIns="0" rtlCol="0" anchor="t">
             <a:spAutoFit/>
           </a:bodyPr>
           <a:lstStyle/>
@@ -10514,12 +10293,12 @@
       </p:sp>
       <p:sp>
         <p:nvSpPr>
-          <p:cNvPr name="TextBox 7" id="7"/>
-          <p:cNvSpPr txBox="true"/>
+          <p:cNvPr id="7" name="TextBox 7"/>
+          <p:cNvSpPr txBox="1"/>
           <p:nvPr/>
         </p:nvSpPr>
         <p:spPr>
-          <a:xfrm rot="0">
+          <a:xfrm>
             <a:off x="769640" y="7934643"/>
             <a:ext cx="16063366" cy="1562100"/>
           </a:xfrm>
@@ -10528,12 +10307,12 @@
           </a:prstGeom>
         </p:spPr>
         <p:txBody>
-          <a:bodyPr anchor="t" rtlCol="false" tIns="0" lIns="0" bIns="0" rIns="0">
+          <a:bodyPr lIns="0" tIns="0" rIns="0" bIns="0" rtlCol="0" anchor="t">
             <a:spAutoFit/>
           </a:bodyPr>
           <a:lstStyle/>
           <a:p>
-            <a:pPr algn="l" marL="0" indent="0" lvl="0">
+            <a:pPr marL="0" lvl="0" indent="0" algn="l">
               <a:lnSpc>
                 <a:spcPts val="6299"/>
               </a:lnSpc>

</xml_diff>